<commit_message>
update roi painter 3d manual
update vis
</commit_message>
<xml_diff>
--- a/SoftRoiPainter3D/img/logo.pptx
+++ b/SoftRoiPainter3D/img/logo.pptx
@@ -6,6 +6,13 @@
   </p:sldMasterIdLst>
   <p:sldIdLst>
     <p:sldId id="256" r:id="rId2"/>
+    <p:sldId id="257" r:id="rId3"/>
+    <p:sldId id="258" r:id="rId4"/>
+    <p:sldId id="260" r:id="rId5"/>
+    <p:sldId id="259" r:id="rId6"/>
+    <p:sldId id="261" r:id="rId7"/>
+    <p:sldId id="262" r:id="rId8"/>
+    <p:sldId id="263" r:id="rId9"/>
   </p:sldIdLst>
   <p:sldSz cx="12192000" cy="6858000"/>
   <p:notesSz cx="6858000" cy="9144000"/>
@@ -104,6 +111,11 @@
       </a:defRPr>
     </a:lvl9pPr>
   </p:defaultTextStyle>
+  <p:extLst>
+    <p:ext uri="{EFAFB233-063F-42B5-8137-9DF3F51BA10A}">
+      <p15:sldGuideLst xmlns:p15="http://schemas.microsoft.com/office/powerpoint/2012/main"/>
+    </p:ext>
+  </p:extLst>
 </p:presentation>
 </file>
 
@@ -238,7 +250,7 @@
           <a:p>
             <a:fld id="{BCBF888F-FE24-46BF-9972-C37473139DE2}" type="datetimeFigureOut">
               <a:rPr kumimoji="1" lang="ja-JP" altLang="en-US" smtClean="0"/>
-              <a:t>2019/4/3</a:t>
+              <a:t>2019/11/23</a:t>
             </a:fld>
             <a:endParaRPr kumimoji="1" lang="ja-JP" altLang="en-US"/>
           </a:p>
@@ -440,7 +452,7 @@
           <a:p>
             <a:fld id="{BCBF888F-FE24-46BF-9972-C37473139DE2}" type="datetimeFigureOut">
               <a:rPr kumimoji="1" lang="ja-JP" altLang="en-US" smtClean="0"/>
-              <a:t>2019/4/3</a:t>
+              <a:t>2019/11/23</a:t>
             </a:fld>
             <a:endParaRPr kumimoji="1" lang="ja-JP" altLang="en-US"/>
           </a:p>
@@ -652,7 +664,7 @@
           <a:p>
             <a:fld id="{BCBF888F-FE24-46BF-9972-C37473139DE2}" type="datetimeFigureOut">
               <a:rPr kumimoji="1" lang="ja-JP" altLang="en-US" smtClean="0"/>
-              <a:t>2019/4/3</a:t>
+              <a:t>2019/11/23</a:t>
             </a:fld>
             <a:endParaRPr kumimoji="1" lang="ja-JP" altLang="en-US"/>
           </a:p>
@@ -854,7 +866,7 @@
           <a:p>
             <a:fld id="{BCBF888F-FE24-46BF-9972-C37473139DE2}" type="datetimeFigureOut">
               <a:rPr kumimoji="1" lang="ja-JP" altLang="en-US" smtClean="0"/>
-              <a:t>2019/4/3</a:t>
+              <a:t>2019/11/23</a:t>
             </a:fld>
             <a:endParaRPr kumimoji="1" lang="ja-JP" altLang="en-US"/>
           </a:p>
@@ -1100,7 +1112,7 @@
           <a:p>
             <a:fld id="{BCBF888F-FE24-46BF-9972-C37473139DE2}" type="datetimeFigureOut">
               <a:rPr kumimoji="1" lang="ja-JP" altLang="en-US" smtClean="0"/>
-              <a:t>2019/4/3</a:t>
+              <a:t>2019/11/23</a:t>
             </a:fld>
             <a:endParaRPr kumimoji="1" lang="ja-JP" altLang="en-US"/>
           </a:p>
@@ -1396,7 +1408,7 @@
           <a:p>
             <a:fld id="{BCBF888F-FE24-46BF-9972-C37473139DE2}" type="datetimeFigureOut">
               <a:rPr kumimoji="1" lang="ja-JP" altLang="en-US" smtClean="0"/>
-              <a:t>2019/4/3</a:t>
+              <a:t>2019/11/23</a:t>
             </a:fld>
             <a:endParaRPr kumimoji="1" lang="ja-JP" altLang="en-US"/>
           </a:p>
@@ -1827,7 +1839,7 @@
           <a:p>
             <a:fld id="{BCBF888F-FE24-46BF-9972-C37473139DE2}" type="datetimeFigureOut">
               <a:rPr kumimoji="1" lang="ja-JP" altLang="en-US" smtClean="0"/>
-              <a:t>2019/4/3</a:t>
+              <a:t>2019/11/23</a:t>
             </a:fld>
             <a:endParaRPr kumimoji="1" lang="ja-JP" altLang="en-US"/>
           </a:p>
@@ -1945,7 +1957,7 @@
           <a:p>
             <a:fld id="{BCBF888F-FE24-46BF-9972-C37473139DE2}" type="datetimeFigureOut">
               <a:rPr kumimoji="1" lang="ja-JP" altLang="en-US" smtClean="0"/>
-              <a:t>2019/4/3</a:t>
+              <a:t>2019/11/23</a:t>
             </a:fld>
             <a:endParaRPr kumimoji="1" lang="ja-JP" altLang="en-US"/>
           </a:p>
@@ -2040,7 +2052,7 @@
           <a:p>
             <a:fld id="{BCBF888F-FE24-46BF-9972-C37473139DE2}" type="datetimeFigureOut">
               <a:rPr kumimoji="1" lang="ja-JP" altLang="en-US" smtClean="0"/>
-              <a:t>2019/4/3</a:t>
+              <a:t>2019/11/23</a:t>
             </a:fld>
             <a:endParaRPr kumimoji="1" lang="ja-JP" altLang="en-US"/>
           </a:p>
@@ -2349,7 +2361,7 @@
           <a:p>
             <a:fld id="{BCBF888F-FE24-46BF-9972-C37473139DE2}" type="datetimeFigureOut">
               <a:rPr kumimoji="1" lang="ja-JP" altLang="en-US" smtClean="0"/>
-              <a:t>2019/4/3</a:t>
+              <a:t>2019/11/23</a:t>
             </a:fld>
             <a:endParaRPr kumimoji="1" lang="ja-JP" altLang="en-US"/>
           </a:p>
@@ -2602,7 +2614,7 @@
           <a:p>
             <a:fld id="{BCBF888F-FE24-46BF-9972-C37473139DE2}" type="datetimeFigureOut">
               <a:rPr kumimoji="1" lang="ja-JP" altLang="en-US" smtClean="0"/>
-              <a:t>2019/4/3</a:t>
+              <a:t>2019/11/23</a:t>
             </a:fld>
             <a:endParaRPr kumimoji="1" lang="ja-JP" altLang="en-US"/>
           </a:p>
@@ -2847,7 +2859,7 @@
           <a:p>
             <a:fld id="{BCBF888F-FE24-46BF-9972-C37473139DE2}" type="datetimeFigureOut">
               <a:rPr kumimoji="1" lang="ja-JP" altLang="en-US" smtClean="0"/>
-              <a:t>2019/4/3</a:t>
+              <a:t>2019/11/23</a:t>
             </a:fld>
             <a:endParaRPr kumimoji="1" lang="ja-JP" altLang="en-US"/>
           </a:p>
@@ -3326,6 +3338,3879 @@
 </p:sld>
 </file>
 
+<file path=ppt/slides/slide2.xml><?xml version="1.0" encoding="utf-8"?>
+<p:sld xmlns:a="http://schemas.openxmlformats.org/drawingml/2006/main" xmlns:r="http://schemas.openxmlformats.org/officeDocument/2006/relationships" xmlns:p="http://schemas.openxmlformats.org/presentationml/2006/main">
+  <p:cSld>
+    <p:spTree>
+      <p:nvGrpSpPr>
+        <p:cNvPr id="1" name=""/>
+        <p:cNvGrpSpPr/>
+        <p:nvPr/>
+      </p:nvGrpSpPr>
+      <p:grpSpPr>
+        <a:xfrm>
+          <a:off x="0" y="0"/>
+          <a:ext cx="0" cy="0"/>
+          <a:chOff x="0" y="0"/>
+          <a:chExt cx="0" cy="0"/>
+        </a:xfrm>
+      </p:grpSpPr>
+      <p:grpSp>
+        <p:nvGrpSpPr>
+          <p:cNvPr id="31" name="グループ化 30"/>
+          <p:cNvGrpSpPr/>
+          <p:nvPr/>
+        </p:nvGrpSpPr>
+        <p:grpSpPr>
+          <a:xfrm>
+            <a:off x="1057790" y="529709"/>
+            <a:ext cx="4705895" cy="5429250"/>
+            <a:chOff x="1057790" y="529709"/>
+            <a:chExt cx="4705895" cy="5429250"/>
+          </a:xfrm>
+        </p:grpSpPr>
+        <p:pic>
+          <p:nvPicPr>
+            <p:cNvPr id="5" name="図 4"/>
+            <p:cNvPicPr>
+              <a:picLocks noChangeAspect="1"/>
+            </p:cNvPicPr>
+            <p:nvPr/>
+          </p:nvPicPr>
+          <p:blipFill>
+            <a:blip r:embed="rId2"/>
+            <a:stretch>
+              <a:fillRect/>
+            </a:stretch>
+          </p:blipFill>
+          <p:spPr>
+            <a:xfrm>
+              <a:off x="1618569" y="529709"/>
+              <a:ext cx="3152775" cy="5429250"/>
+            </a:xfrm>
+            <a:prstGeom prst="rect">
+              <a:avLst/>
+            </a:prstGeom>
+          </p:spPr>
+        </p:pic>
+        <p:sp>
+          <p:nvSpPr>
+            <p:cNvPr id="6" name="角丸四角形 5"/>
+            <p:cNvSpPr/>
+            <p:nvPr/>
+          </p:nvSpPr>
+          <p:spPr>
+            <a:xfrm>
+              <a:off x="4860472" y="1487387"/>
+              <a:ext cx="729343" cy="424544"/>
+            </a:xfrm>
+            <a:prstGeom prst="roundRect">
+              <a:avLst/>
+            </a:prstGeom>
+            <a:solidFill>
+              <a:srgbClr val="002060"/>
+            </a:solidFill>
+            <a:ln>
+              <a:noFill/>
+            </a:ln>
+          </p:spPr>
+          <p:style>
+            <a:lnRef idx="2">
+              <a:schemeClr val="accent1">
+                <a:shade val="50000"/>
+              </a:schemeClr>
+            </a:lnRef>
+            <a:fillRef idx="1">
+              <a:schemeClr val="accent1"/>
+            </a:fillRef>
+            <a:effectRef idx="0">
+              <a:schemeClr val="accent1"/>
+            </a:effectRef>
+            <a:fontRef idx="minor">
+              <a:schemeClr val="lt1"/>
+            </a:fontRef>
+          </p:style>
+          <p:txBody>
+            <a:bodyPr rtlCol="0" anchor="ctr"/>
+            <a:lstStyle/>
+            <a:p>
+              <a:pPr algn="ctr"/>
+              <a:r>
+                <a:rPr lang="en-US" altLang="ja-JP" sz="3200" dirty="0" smtClean="0"/>
+                <a:t>d1</a:t>
+              </a:r>
+              <a:endParaRPr kumimoji="1" lang="ja-JP" altLang="en-US" sz="3200" dirty="0"/>
+            </a:p>
+          </p:txBody>
+        </p:sp>
+        <p:cxnSp>
+          <p:nvCxnSpPr>
+            <p:cNvPr id="9" name="直線矢印コネクタ 8"/>
+            <p:cNvCxnSpPr>
+              <a:stCxn id="6" idx="1"/>
+            </p:cNvCxnSpPr>
+            <p:nvPr/>
+          </p:nvCxnSpPr>
+          <p:spPr>
+            <a:xfrm flipH="1">
+              <a:off x="3554186" y="1699659"/>
+              <a:ext cx="1306286" cy="375557"/>
+            </a:xfrm>
+            <a:prstGeom prst="straightConnector1">
+              <a:avLst/>
+            </a:prstGeom>
+            <a:ln w="28575">
+              <a:solidFill>
+                <a:srgbClr val="002060"/>
+              </a:solidFill>
+              <a:tailEnd type="stealth" w="lg" len="lg"/>
+            </a:ln>
+          </p:spPr>
+          <p:style>
+            <a:lnRef idx="1">
+              <a:schemeClr val="accent1"/>
+            </a:lnRef>
+            <a:fillRef idx="0">
+              <a:schemeClr val="accent1"/>
+            </a:fillRef>
+            <a:effectRef idx="0">
+              <a:schemeClr val="accent1"/>
+            </a:effectRef>
+            <a:fontRef idx="minor">
+              <a:schemeClr val="tx1"/>
+            </a:fontRef>
+          </p:style>
+        </p:cxnSp>
+        <p:sp>
+          <p:nvSpPr>
+            <p:cNvPr id="10" name="角丸四角形 9"/>
+            <p:cNvSpPr/>
+            <p:nvPr/>
+          </p:nvSpPr>
+          <p:spPr>
+            <a:xfrm>
+              <a:off x="4874322" y="2096986"/>
+              <a:ext cx="729343" cy="424544"/>
+            </a:xfrm>
+            <a:prstGeom prst="roundRect">
+              <a:avLst/>
+            </a:prstGeom>
+            <a:solidFill>
+              <a:srgbClr val="002060"/>
+            </a:solidFill>
+            <a:ln>
+              <a:noFill/>
+            </a:ln>
+          </p:spPr>
+          <p:style>
+            <a:lnRef idx="2">
+              <a:schemeClr val="accent1">
+                <a:shade val="50000"/>
+              </a:schemeClr>
+            </a:lnRef>
+            <a:fillRef idx="1">
+              <a:schemeClr val="accent1"/>
+            </a:fillRef>
+            <a:effectRef idx="0">
+              <a:schemeClr val="accent1"/>
+            </a:effectRef>
+            <a:fontRef idx="minor">
+              <a:schemeClr val="lt1"/>
+            </a:fontRef>
+          </p:style>
+          <p:txBody>
+            <a:bodyPr rtlCol="0" anchor="ctr"/>
+            <a:lstStyle/>
+            <a:p>
+              <a:pPr algn="ctr"/>
+              <a:r>
+                <a:rPr lang="en-US" altLang="ja-JP" sz="3200" dirty="0" smtClean="0"/>
+                <a:t>d2</a:t>
+              </a:r>
+              <a:endParaRPr kumimoji="1" lang="ja-JP" altLang="en-US" sz="3200" dirty="0"/>
+            </a:p>
+          </p:txBody>
+        </p:sp>
+        <p:cxnSp>
+          <p:nvCxnSpPr>
+            <p:cNvPr id="11" name="直線矢印コネクタ 10"/>
+            <p:cNvCxnSpPr>
+              <a:stCxn id="10" idx="1"/>
+            </p:cNvCxnSpPr>
+            <p:nvPr/>
+          </p:nvCxnSpPr>
+          <p:spPr>
+            <a:xfrm flipH="1">
+              <a:off x="3568036" y="2309258"/>
+              <a:ext cx="1306286" cy="375557"/>
+            </a:xfrm>
+            <a:prstGeom prst="straightConnector1">
+              <a:avLst/>
+            </a:prstGeom>
+            <a:ln w="28575">
+              <a:solidFill>
+                <a:srgbClr val="002060"/>
+              </a:solidFill>
+              <a:tailEnd type="stealth" w="lg" len="lg"/>
+            </a:ln>
+          </p:spPr>
+          <p:style>
+            <a:lnRef idx="1">
+              <a:schemeClr val="accent1"/>
+            </a:lnRef>
+            <a:fillRef idx="0">
+              <a:schemeClr val="accent1"/>
+            </a:fillRef>
+            <a:effectRef idx="0">
+              <a:schemeClr val="accent1"/>
+            </a:effectRef>
+            <a:fontRef idx="minor">
+              <a:schemeClr val="tx1"/>
+            </a:fontRef>
+          </p:style>
+        </p:cxnSp>
+        <p:sp>
+          <p:nvSpPr>
+            <p:cNvPr id="12" name="角丸四角形 11"/>
+            <p:cNvSpPr/>
+            <p:nvPr/>
+          </p:nvSpPr>
+          <p:spPr>
+            <a:xfrm>
+              <a:off x="5034342" y="2907709"/>
+              <a:ext cx="729343" cy="368891"/>
+            </a:xfrm>
+            <a:prstGeom prst="roundRect">
+              <a:avLst/>
+            </a:prstGeom>
+            <a:solidFill>
+              <a:srgbClr val="002060"/>
+            </a:solidFill>
+            <a:ln>
+              <a:noFill/>
+            </a:ln>
+          </p:spPr>
+          <p:style>
+            <a:lnRef idx="2">
+              <a:schemeClr val="accent1">
+                <a:shade val="50000"/>
+              </a:schemeClr>
+            </a:lnRef>
+            <a:fillRef idx="1">
+              <a:schemeClr val="accent1"/>
+            </a:fillRef>
+            <a:effectRef idx="0">
+              <a:schemeClr val="accent1"/>
+            </a:effectRef>
+            <a:fontRef idx="minor">
+              <a:schemeClr val="lt1"/>
+            </a:fontRef>
+          </p:style>
+          <p:txBody>
+            <a:bodyPr rtlCol="0" anchor="ctr"/>
+            <a:lstStyle/>
+            <a:p>
+              <a:pPr algn="ctr"/>
+              <a:r>
+                <a:rPr lang="en-US" altLang="ja-JP" sz="3200" dirty="0" smtClean="0"/>
+                <a:t>d3</a:t>
+              </a:r>
+              <a:endParaRPr kumimoji="1" lang="ja-JP" altLang="en-US" sz="3200" dirty="0"/>
+            </a:p>
+          </p:txBody>
+        </p:sp>
+        <p:cxnSp>
+          <p:nvCxnSpPr>
+            <p:cNvPr id="13" name="直線矢印コネクタ 12"/>
+            <p:cNvCxnSpPr>
+              <a:stCxn id="12" idx="1"/>
+            </p:cNvCxnSpPr>
+            <p:nvPr/>
+          </p:nvCxnSpPr>
+          <p:spPr>
+            <a:xfrm flipH="1">
+              <a:off x="4389120" y="3092155"/>
+              <a:ext cx="645222" cy="213327"/>
+            </a:xfrm>
+            <a:prstGeom prst="straightConnector1">
+              <a:avLst/>
+            </a:prstGeom>
+            <a:ln w="28575">
+              <a:solidFill>
+                <a:srgbClr val="002060"/>
+              </a:solidFill>
+              <a:tailEnd type="stealth" w="lg" len="lg"/>
+            </a:ln>
+          </p:spPr>
+          <p:style>
+            <a:lnRef idx="1">
+              <a:schemeClr val="accent1"/>
+            </a:lnRef>
+            <a:fillRef idx="0">
+              <a:schemeClr val="accent1"/>
+            </a:fillRef>
+            <a:effectRef idx="0">
+              <a:schemeClr val="accent1"/>
+            </a:effectRef>
+            <a:fontRef idx="minor">
+              <a:schemeClr val="tx1"/>
+            </a:fontRef>
+          </p:style>
+        </p:cxnSp>
+        <p:sp>
+          <p:nvSpPr>
+            <p:cNvPr id="15" name="角丸四角形 14"/>
+            <p:cNvSpPr/>
+            <p:nvPr/>
+          </p:nvSpPr>
+          <p:spPr>
+            <a:xfrm>
+              <a:off x="5034342" y="3319189"/>
+              <a:ext cx="729343" cy="368891"/>
+            </a:xfrm>
+            <a:prstGeom prst="roundRect">
+              <a:avLst/>
+            </a:prstGeom>
+            <a:solidFill>
+              <a:srgbClr val="002060"/>
+            </a:solidFill>
+            <a:ln>
+              <a:noFill/>
+            </a:ln>
+          </p:spPr>
+          <p:style>
+            <a:lnRef idx="2">
+              <a:schemeClr val="accent1">
+                <a:shade val="50000"/>
+              </a:schemeClr>
+            </a:lnRef>
+            <a:fillRef idx="1">
+              <a:schemeClr val="accent1"/>
+            </a:fillRef>
+            <a:effectRef idx="0">
+              <a:schemeClr val="accent1"/>
+            </a:effectRef>
+            <a:fontRef idx="minor">
+              <a:schemeClr val="lt1"/>
+            </a:fontRef>
+          </p:style>
+          <p:txBody>
+            <a:bodyPr rtlCol="0" anchor="ctr"/>
+            <a:lstStyle/>
+            <a:p>
+              <a:pPr algn="ctr"/>
+              <a:r>
+                <a:rPr lang="en-US" altLang="ja-JP" sz="3200" dirty="0" smtClean="0"/>
+                <a:t>d4</a:t>
+              </a:r>
+              <a:endParaRPr kumimoji="1" lang="ja-JP" altLang="en-US" sz="3200" dirty="0"/>
+            </a:p>
+          </p:txBody>
+        </p:sp>
+        <p:cxnSp>
+          <p:nvCxnSpPr>
+            <p:cNvPr id="16" name="直線矢印コネクタ 15"/>
+            <p:cNvCxnSpPr>
+              <a:stCxn id="15" idx="1"/>
+            </p:cNvCxnSpPr>
+            <p:nvPr/>
+          </p:nvCxnSpPr>
+          <p:spPr>
+            <a:xfrm flipH="1">
+              <a:off x="4396740" y="3503635"/>
+              <a:ext cx="637602" cy="213327"/>
+            </a:xfrm>
+            <a:prstGeom prst="straightConnector1">
+              <a:avLst/>
+            </a:prstGeom>
+            <a:ln w="28575">
+              <a:solidFill>
+                <a:srgbClr val="002060"/>
+              </a:solidFill>
+              <a:tailEnd type="stealth" w="lg" len="lg"/>
+            </a:ln>
+          </p:spPr>
+          <p:style>
+            <a:lnRef idx="1">
+              <a:schemeClr val="accent1"/>
+            </a:lnRef>
+            <a:fillRef idx="0">
+              <a:schemeClr val="accent1"/>
+            </a:fillRef>
+            <a:effectRef idx="0">
+              <a:schemeClr val="accent1"/>
+            </a:effectRef>
+            <a:fontRef idx="minor">
+              <a:schemeClr val="tx1"/>
+            </a:fontRef>
+          </p:style>
+        </p:cxnSp>
+        <p:sp>
+          <p:nvSpPr>
+            <p:cNvPr id="17" name="角丸四角形 16"/>
+            <p:cNvSpPr/>
+            <p:nvPr/>
+          </p:nvSpPr>
+          <p:spPr>
+            <a:xfrm>
+              <a:off x="5034342" y="3730669"/>
+              <a:ext cx="729343" cy="368891"/>
+            </a:xfrm>
+            <a:prstGeom prst="roundRect">
+              <a:avLst/>
+            </a:prstGeom>
+            <a:solidFill>
+              <a:srgbClr val="002060"/>
+            </a:solidFill>
+            <a:ln>
+              <a:noFill/>
+            </a:ln>
+          </p:spPr>
+          <p:style>
+            <a:lnRef idx="2">
+              <a:schemeClr val="accent1">
+                <a:shade val="50000"/>
+              </a:schemeClr>
+            </a:lnRef>
+            <a:fillRef idx="1">
+              <a:schemeClr val="accent1"/>
+            </a:fillRef>
+            <a:effectRef idx="0">
+              <a:schemeClr val="accent1"/>
+            </a:effectRef>
+            <a:fontRef idx="minor">
+              <a:schemeClr val="lt1"/>
+            </a:fontRef>
+          </p:style>
+          <p:txBody>
+            <a:bodyPr rtlCol="0" anchor="ctr"/>
+            <a:lstStyle/>
+            <a:p>
+              <a:pPr algn="ctr"/>
+              <a:r>
+                <a:rPr lang="en-US" altLang="ja-JP" sz="3200" dirty="0" smtClean="0"/>
+                <a:t>d5</a:t>
+              </a:r>
+              <a:endParaRPr kumimoji="1" lang="ja-JP" altLang="en-US" sz="3200" dirty="0"/>
+            </a:p>
+          </p:txBody>
+        </p:sp>
+        <p:cxnSp>
+          <p:nvCxnSpPr>
+            <p:cNvPr id="18" name="直線矢印コネクタ 17"/>
+            <p:cNvCxnSpPr>
+              <a:stCxn id="17" idx="1"/>
+            </p:cNvCxnSpPr>
+            <p:nvPr/>
+          </p:nvCxnSpPr>
+          <p:spPr>
+            <a:xfrm flipH="1">
+              <a:off x="4396740" y="3915115"/>
+              <a:ext cx="637602" cy="213327"/>
+            </a:xfrm>
+            <a:prstGeom prst="straightConnector1">
+              <a:avLst/>
+            </a:prstGeom>
+            <a:ln w="28575">
+              <a:solidFill>
+                <a:srgbClr val="002060"/>
+              </a:solidFill>
+              <a:tailEnd type="stealth" w="lg" len="lg"/>
+            </a:ln>
+          </p:spPr>
+          <p:style>
+            <a:lnRef idx="1">
+              <a:schemeClr val="accent1"/>
+            </a:lnRef>
+            <a:fillRef idx="0">
+              <a:schemeClr val="accent1"/>
+            </a:fillRef>
+            <a:effectRef idx="0">
+              <a:schemeClr val="accent1"/>
+            </a:effectRef>
+            <a:fontRef idx="minor">
+              <a:schemeClr val="tx1"/>
+            </a:fontRef>
+          </p:style>
+        </p:cxnSp>
+        <p:sp>
+          <p:nvSpPr>
+            <p:cNvPr id="22" name="角丸四角形 21"/>
+            <p:cNvSpPr/>
+            <p:nvPr/>
+          </p:nvSpPr>
+          <p:spPr>
+            <a:xfrm>
+              <a:off x="4771344" y="4284006"/>
+              <a:ext cx="729343" cy="368891"/>
+            </a:xfrm>
+            <a:prstGeom prst="roundRect">
+              <a:avLst/>
+            </a:prstGeom>
+            <a:solidFill>
+              <a:srgbClr val="002060"/>
+            </a:solidFill>
+            <a:ln>
+              <a:noFill/>
+            </a:ln>
+          </p:spPr>
+          <p:style>
+            <a:lnRef idx="2">
+              <a:schemeClr val="accent1">
+                <a:shade val="50000"/>
+              </a:schemeClr>
+            </a:lnRef>
+            <a:fillRef idx="1">
+              <a:schemeClr val="accent1"/>
+            </a:fillRef>
+            <a:effectRef idx="0">
+              <a:schemeClr val="accent1"/>
+            </a:effectRef>
+            <a:fontRef idx="minor">
+              <a:schemeClr val="lt1"/>
+            </a:fontRef>
+          </p:style>
+          <p:txBody>
+            <a:bodyPr rtlCol="0" anchor="ctr"/>
+            <a:lstStyle/>
+            <a:p>
+              <a:pPr algn="ctr"/>
+              <a:r>
+                <a:rPr lang="en-US" altLang="ja-JP" sz="3200" dirty="0" smtClean="0"/>
+                <a:t>d7</a:t>
+              </a:r>
+              <a:endParaRPr kumimoji="1" lang="ja-JP" altLang="en-US" sz="3200" dirty="0"/>
+            </a:p>
+          </p:txBody>
+        </p:sp>
+        <p:cxnSp>
+          <p:nvCxnSpPr>
+            <p:cNvPr id="23" name="直線矢印コネクタ 22"/>
+            <p:cNvCxnSpPr/>
+            <p:nvPr/>
+          </p:nvCxnSpPr>
+          <p:spPr>
+            <a:xfrm flipH="1">
+              <a:off x="4133742" y="4468451"/>
+              <a:ext cx="637602" cy="213327"/>
+            </a:xfrm>
+            <a:prstGeom prst="straightConnector1">
+              <a:avLst/>
+            </a:prstGeom>
+            <a:ln w="28575">
+              <a:solidFill>
+                <a:srgbClr val="002060"/>
+              </a:solidFill>
+              <a:tailEnd type="stealth" w="lg" len="lg"/>
+            </a:ln>
+          </p:spPr>
+          <p:style>
+            <a:lnRef idx="1">
+              <a:schemeClr val="accent1"/>
+            </a:lnRef>
+            <a:fillRef idx="0">
+              <a:schemeClr val="accent1"/>
+            </a:fillRef>
+            <a:effectRef idx="0">
+              <a:schemeClr val="accent1"/>
+            </a:effectRef>
+            <a:fontRef idx="minor">
+              <a:schemeClr val="tx1"/>
+            </a:fontRef>
+          </p:style>
+        </p:cxnSp>
+        <p:sp>
+          <p:nvSpPr>
+            <p:cNvPr id="24" name="角丸四角形 23"/>
+            <p:cNvSpPr/>
+            <p:nvPr/>
+          </p:nvSpPr>
+          <p:spPr>
+            <a:xfrm>
+              <a:off x="4771343" y="4695485"/>
+              <a:ext cx="729343" cy="368891"/>
+            </a:xfrm>
+            <a:prstGeom prst="roundRect">
+              <a:avLst/>
+            </a:prstGeom>
+            <a:solidFill>
+              <a:srgbClr val="002060"/>
+            </a:solidFill>
+            <a:ln>
+              <a:noFill/>
+            </a:ln>
+          </p:spPr>
+          <p:style>
+            <a:lnRef idx="2">
+              <a:schemeClr val="accent1">
+                <a:shade val="50000"/>
+              </a:schemeClr>
+            </a:lnRef>
+            <a:fillRef idx="1">
+              <a:schemeClr val="accent1"/>
+            </a:fillRef>
+            <a:effectRef idx="0">
+              <a:schemeClr val="accent1"/>
+            </a:effectRef>
+            <a:fontRef idx="minor">
+              <a:schemeClr val="lt1"/>
+            </a:fontRef>
+          </p:style>
+          <p:txBody>
+            <a:bodyPr rtlCol="0" anchor="ctr"/>
+            <a:lstStyle/>
+            <a:p>
+              <a:pPr algn="ctr"/>
+              <a:r>
+                <a:rPr lang="en-US" altLang="ja-JP" sz="3200" dirty="0" smtClean="0"/>
+                <a:t>d8</a:t>
+              </a:r>
+              <a:endParaRPr kumimoji="1" lang="ja-JP" altLang="en-US" sz="3200" dirty="0"/>
+            </a:p>
+          </p:txBody>
+        </p:sp>
+        <p:cxnSp>
+          <p:nvCxnSpPr>
+            <p:cNvPr id="25" name="直線矢印コネクタ 24"/>
+            <p:cNvCxnSpPr/>
+            <p:nvPr/>
+          </p:nvCxnSpPr>
+          <p:spPr>
+            <a:xfrm flipH="1">
+              <a:off x="4133742" y="4854197"/>
+              <a:ext cx="637602" cy="213327"/>
+            </a:xfrm>
+            <a:prstGeom prst="straightConnector1">
+              <a:avLst/>
+            </a:prstGeom>
+            <a:ln w="28575">
+              <a:solidFill>
+                <a:srgbClr val="002060"/>
+              </a:solidFill>
+              <a:tailEnd type="stealth" w="lg" len="lg"/>
+            </a:ln>
+          </p:spPr>
+          <p:style>
+            <a:lnRef idx="1">
+              <a:schemeClr val="accent1"/>
+            </a:lnRef>
+            <a:fillRef idx="0">
+              <a:schemeClr val="accent1"/>
+            </a:fillRef>
+            <a:effectRef idx="0">
+              <a:schemeClr val="accent1"/>
+            </a:effectRef>
+            <a:fontRef idx="minor">
+              <a:schemeClr val="tx1"/>
+            </a:fontRef>
+          </p:style>
+        </p:cxnSp>
+        <p:sp>
+          <p:nvSpPr>
+            <p:cNvPr id="26" name="角丸四角形 25"/>
+            <p:cNvSpPr/>
+            <p:nvPr/>
+          </p:nvSpPr>
+          <p:spPr>
+            <a:xfrm>
+              <a:off x="1057790" y="5145067"/>
+              <a:ext cx="729343" cy="368891"/>
+            </a:xfrm>
+            <a:prstGeom prst="roundRect">
+              <a:avLst/>
+            </a:prstGeom>
+            <a:solidFill>
+              <a:srgbClr val="002060"/>
+            </a:solidFill>
+            <a:ln>
+              <a:noFill/>
+            </a:ln>
+          </p:spPr>
+          <p:style>
+            <a:lnRef idx="2">
+              <a:schemeClr val="accent1">
+                <a:shade val="50000"/>
+              </a:schemeClr>
+            </a:lnRef>
+            <a:fillRef idx="1">
+              <a:schemeClr val="accent1"/>
+            </a:fillRef>
+            <a:effectRef idx="0">
+              <a:schemeClr val="accent1"/>
+            </a:effectRef>
+            <a:fontRef idx="minor">
+              <a:schemeClr val="lt1"/>
+            </a:fontRef>
+          </p:style>
+          <p:txBody>
+            <a:bodyPr rtlCol="0" anchor="ctr"/>
+            <a:lstStyle/>
+            <a:p>
+              <a:pPr algn="ctr"/>
+              <a:r>
+                <a:rPr lang="en-US" altLang="ja-JP" sz="3200" dirty="0" smtClean="0"/>
+                <a:t>d6</a:t>
+              </a:r>
+              <a:endParaRPr kumimoji="1" lang="ja-JP" altLang="en-US" sz="3200" dirty="0"/>
+            </a:p>
+          </p:txBody>
+        </p:sp>
+        <p:sp>
+          <p:nvSpPr>
+            <p:cNvPr id="27" name="角丸四角形 26"/>
+            <p:cNvSpPr/>
+            <p:nvPr/>
+          </p:nvSpPr>
+          <p:spPr>
+            <a:xfrm>
+              <a:off x="4778963" y="5106965"/>
+              <a:ext cx="729343" cy="368891"/>
+            </a:xfrm>
+            <a:prstGeom prst="roundRect">
+              <a:avLst/>
+            </a:prstGeom>
+            <a:solidFill>
+              <a:srgbClr val="002060"/>
+            </a:solidFill>
+            <a:ln>
+              <a:noFill/>
+            </a:ln>
+          </p:spPr>
+          <p:style>
+            <a:lnRef idx="2">
+              <a:schemeClr val="accent1">
+                <a:shade val="50000"/>
+              </a:schemeClr>
+            </a:lnRef>
+            <a:fillRef idx="1">
+              <a:schemeClr val="accent1"/>
+            </a:fillRef>
+            <a:effectRef idx="0">
+              <a:schemeClr val="accent1"/>
+            </a:effectRef>
+            <a:fontRef idx="minor">
+              <a:schemeClr val="lt1"/>
+            </a:fontRef>
+          </p:style>
+          <p:txBody>
+            <a:bodyPr rtlCol="0" anchor="ctr"/>
+            <a:lstStyle/>
+            <a:p>
+              <a:pPr algn="ctr"/>
+              <a:r>
+                <a:rPr lang="en-US" altLang="ja-JP" sz="3200" dirty="0" smtClean="0"/>
+                <a:t>d9</a:t>
+              </a:r>
+              <a:endParaRPr kumimoji="1" lang="ja-JP" altLang="en-US" sz="3200" dirty="0"/>
+            </a:p>
+          </p:txBody>
+        </p:sp>
+        <p:cxnSp>
+          <p:nvCxnSpPr>
+            <p:cNvPr id="28" name="直線矢印コネクタ 27"/>
+            <p:cNvCxnSpPr/>
+            <p:nvPr/>
+          </p:nvCxnSpPr>
+          <p:spPr>
+            <a:xfrm flipH="1">
+              <a:off x="4141362" y="5265677"/>
+              <a:ext cx="637602" cy="213327"/>
+            </a:xfrm>
+            <a:prstGeom prst="straightConnector1">
+              <a:avLst/>
+            </a:prstGeom>
+            <a:ln w="28575">
+              <a:solidFill>
+                <a:srgbClr val="002060"/>
+              </a:solidFill>
+              <a:tailEnd type="stealth" w="lg" len="lg"/>
+            </a:ln>
+          </p:spPr>
+          <p:style>
+            <a:lnRef idx="1">
+              <a:schemeClr val="accent1"/>
+            </a:lnRef>
+            <a:fillRef idx="0">
+              <a:schemeClr val="accent1"/>
+            </a:fillRef>
+            <a:effectRef idx="0">
+              <a:schemeClr val="accent1"/>
+            </a:effectRef>
+            <a:fontRef idx="minor">
+              <a:schemeClr val="tx1"/>
+            </a:fontRef>
+          </p:style>
+        </p:cxnSp>
+        <p:cxnSp>
+          <p:nvCxnSpPr>
+            <p:cNvPr id="29" name="直線矢印コネクタ 28"/>
+            <p:cNvCxnSpPr/>
+            <p:nvPr/>
+          </p:nvCxnSpPr>
+          <p:spPr>
+            <a:xfrm flipV="1">
+              <a:off x="1468333" y="4575114"/>
+              <a:ext cx="318800" cy="584939"/>
+            </a:xfrm>
+            <a:prstGeom prst="straightConnector1">
+              <a:avLst/>
+            </a:prstGeom>
+            <a:ln w="28575">
+              <a:solidFill>
+                <a:srgbClr val="002060"/>
+              </a:solidFill>
+              <a:tailEnd type="stealth" w="lg" len="lg"/>
+            </a:ln>
+          </p:spPr>
+          <p:style>
+            <a:lnRef idx="1">
+              <a:schemeClr val="accent1"/>
+            </a:lnRef>
+            <a:fillRef idx="0">
+              <a:schemeClr val="accent1"/>
+            </a:fillRef>
+            <a:effectRef idx="0">
+              <a:schemeClr val="accent1"/>
+            </a:effectRef>
+            <a:fontRef idx="minor">
+              <a:schemeClr val="tx1"/>
+            </a:fontRef>
+          </p:style>
+        </p:cxnSp>
+      </p:grpSp>
+    </p:spTree>
+    <p:extLst>
+      <p:ext uri="{BB962C8B-B14F-4D97-AF65-F5344CB8AC3E}">
+        <p14:creationId xmlns:p14="http://schemas.microsoft.com/office/powerpoint/2010/main" val="2526647997"/>
+      </p:ext>
+    </p:extLst>
+  </p:cSld>
+  <p:clrMapOvr>
+    <a:masterClrMapping/>
+  </p:clrMapOvr>
+</p:sld>
+</file>
+
+<file path=ppt/slides/slide3.xml><?xml version="1.0" encoding="utf-8"?>
+<p:sld xmlns:a="http://schemas.openxmlformats.org/drawingml/2006/main" xmlns:r="http://schemas.openxmlformats.org/officeDocument/2006/relationships" xmlns:p="http://schemas.openxmlformats.org/presentationml/2006/main">
+  <p:cSld>
+    <p:spTree>
+      <p:nvGrpSpPr>
+        <p:cNvPr id="1" name=""/>
+        <p:cNvGrpSpPr/>
+        <p:nvPr/>
+      </p:nvGrpSpPr>
+      <p:grpSpPr>
+        <a:xfrm>
+          <a:off x="0" y="0"/>
+          <a:ext cx="0" cy="0"/>
+          <a:chOff x="0" y="0"/>
+          <a:chExt cx="0" cy="0"/>
+        </a:xfrm>
+      </p:grpSpPr>
+      <p:pic>
+        <p:nvPicPr>
+          <p:cNvPr id="27" name="図 26"/>
+          <p:cNvPicPr>
+            <a:picLocks noChangeAspect="1"/>
+          </p:cNvPicPr>
+          <p:nvPr/>
+        </p:nvPicPr>
+        <p:blipFill>
+          <a:blip r:embed="rId2"/>
+          <a:stretch>
+            <a:fillRect/>
+          </a:stretch>
+        </p:blipFill>
+        <p:spPr>
+          <a:xfrm>
+            <a:off x="1026161" y="596294"/>
+            <a:ext cx="3183754" cy="4513234"/>
+          </a:xfrm>
+          <a:prstGeom prst="rect">
+            <a:avLst/>
+          </a:prstGeom>
+        </p:spPr>
+      </p:pic>
+      <p:cxnSp>
+        <p:nvCxnSpPr>
+          <p:cNvPr id="6" name="直線矢印コネクタ 5"/>
+          <p:cNvCxnSpPr>
+            <a:stCxn id="5" idx="1"/>
+          </p:cNvCxnSpPr>
+          <p:nvPr/>
+        </p:nvCxnSpPr>
+        <p:spPr>
+          <a:xfrm flipH="1">
+            <a:off x="3942080" y="1882539"/>
+            <a:ext cx="430712" cy="212272"/>
+          </a:xfrm>
+          <a:prstGeom prst="straightConnector1">
+            <a:avLst/>
+          </a:prstGeom>
+          <a:ln w="28575">
+            <a:solidFill>
+              <a:srgbClr val="002060"/>
+            </a:solidFill>
+            <a:tailEnd type="stealth" w="lg" len="lg"/>
+          </a:ln>
+        </p:spPr>
+        <p:style>
+          <a:lnRef idx="1">
+            <a:schemeClr val="accent1"/>
+          </a:lnRef>
+          <a:fillRef idx="0">
+            <a:schemeClr val="accent1"/>
+          </a:fillRef>
+          <a:effectRef idx="0">
+            <a:schemeClr val="accent1"/>
+          </a:effectRef>
+          <a:fontRef idx="minor">
+            <a:schemeClr val="tx1"/>
+          </a:fontRef>
+        </p:style>
+      </p:cxnSp>
+      <p:sp>
+        <p:nvSpPr>
+          <p:cNvPr id="5" name="角丸四角形 4"/>
+          <p:cNvSpPr/>
+          <p:nvPr/>
+        </p:nvSpPr>
+        <p:spPr>
+          <a:xfrm>
+            <a:off x="4372792" y="1670267"/>
+            <a:ext cx="729343" cy="424544"/>
+          </a:xfrm>
+          <a:prstGeom prst="roundRect">
+            <a:avLst/>
+          </a:prstGeom>
+          <a:solidFill>
+            <a:srgbClr val="002060"/>
+          </a:solidFill>
+          <a:ln>
+            <a:noFill/>
+          </a:ln>
+        </p:spPr>
+        <p:style>
+          <a:lnRef idx="2">
+            <a:schemeClr val="accent1">
+              <a:shade val="50000"/>
+            </a:schemeClr>
+          </a:lnRef>
+          <a:fillRef idx="1">
+            <a:schemeClr val="accent1"/>
+          </a:fillRef>
+          <a:effectRef idx="0">
+            <a:schemeClr val="accent1"/>
+          </a:effectRef>
+          <a:fontRef idx="minor">
+            <a:schemeClr val="lt1"/>
+          </a:fontRef>
+        </p:style>
+        <p:txBody>
+          <a:bodyPr rtlCol="0" anchor="ctr"/>
+          <a:lstStyle/>
+          <a:p>
+            <a:pPr algn="ctr"/>
+            <a:r>
+              <a:rPr lang="en-US" altLang="ja-JP" sz="3200" dirty="0" smtClean="0"/>
+              <a:t>d1</a:t>
+            </a:r>
+            <a:endParaRPr kumimoji="1" lang="ja-JP" altLang="en-US" sz="3200" dirty="0"/>
+          </a:p>
+        </p:txBody>
+      </p:sp>
+      <p:cxnSp>
+        <p:nvCxnSpPr>
+          <p:cNvPr id="9" name="直線矢印コネクタ 8"/>
+          <p:cNvCxnSpPr>
+            <a:stCxn id="10" idx="1"/>
+          </p:cNvCxnSpPr>
+          <p:nvPr/>
+        </p:nvCxnSpPr>
+        <p:spPr>
+          <a:xfrm flipH="1">
+            <a:off x="3505200" y="2351897"/>
+            <a:ext cx="867592" cy="375010"/>
+          </a:xfrm>
+          <a:prstGeom prst="straightConnector1">
+            <a:avLst/>
+          </a:prstGeom>
+          <a:ln w="28575">
+            <a:solidFill>
+              <a:srgbClr val="002060"/>
+            </a:solidFill>
+            <a:tailEnd type="stealth" w="lg" len="lg"/>
+          </a:ln>
+        </p:spPr>
+        <p:style>
+          <a:lnRef idx="1">
+            <a:schemeClr val="accent1"/>
+          </a:lnRef>
+          <a:fillRef idx="0">
+            <a:schemeClr val="accent1"/>
+          </a:fillRef>
+          <a:effectRef idx="0">
+            <a:schemeClr val="accent1"/>
+          </a:effectRef>
+          <a:fontRef idx="minor">
+            <a:schemeClr val="tx1"/>
+          </a:fontRef>
+        </p:style>
+      </p:cxnSp>
+      <p:sp>
+        <p:nvSpPr>
+          <p:cNvPr id="10" name="角丸四角形 9"/>
+          <p:cNvSpPr/>
+          <p:nvPr/>
+        </p:nvSpPr>
+        <p:spPr>
+          <a:xfrm>
+            <a:off x="4372792" y="2139625"/>
+            <a:ext cx="729343" cy="424544"/>
+          </a:xfrm>
+          <a:prstGeom prst="roundRect">
+            <a:avLst/>
+          </a:prstGeom>
+          <a:solidFill>
+            <a:srgbClr val="002060"/>
+          </a:solidFill>
+          <a:ln>
+            <a:noFill/>
+          </a:ln>
+        </p:spPr>
+        <p:style>
+          <a:lnRef idx="2">
+            <a:schemeClr val="accent1">
+              <a:shade val="50000"/>
+            </a:schemeClr>
+          </a:lnRef>
+          <a:fillRef idx="1">
+            <a:schemeClr val="accent1"/>
+          </a:fillRef>
+          <a:effectRef idx="0">
+            <a:schemeClr val="accent1"/>
+          </a:effectRef>
+          <a:fontRef idx="minor">
+            <a:schemeClr val="lt1"/>
+          </a:fontRef>
+        </p:style>
+        <p:txBody>
+          <a:bodyPr rtlCol="0" anchor="ctr"/>
+          <a:lstStyle/>
+          <a:p>
+            <a:pPr algn="ctr"/>
+            <a:r>
+              <a:rPr lang="en-US" altLang="ja-JP" sz="3200" dirty="0" smtClean="0"/>
+              <a:t>d2</a:t>
+            </a:r>
+            <a:endParaRPr kumimoji="1" lang="ja-JP" altLang="en-US" sz="3200" dirty="0"/>
+          </a:p>
+        </p:txBody>
+      </p:sp>
+      <p:cxnSp>
+        <p:nvCxnSpPr>
+          <p:cNvPr id="12" name="直線矢印コネクタ 11"/>
+          <p:cNvCxnSpPr>
+            <a:stCxn id="13" idx="1"/>
+          </p:cNvCxnSpPr>
+          <p:nvPr/>
+        </p:nvCxnSpPr>
+        <p:spPr>
+          <a:xfrm flipH="1">
+            <a:off x="3942080" y="2821255"/>
+            <a:ext cx="430712" cy="237159"/>
+          </a:xfrm>
+          <a:prstGeom prst="straightConnector1">
+            <a:avLst/>
+          </a:prstGeom>
+          <a:ln w="28575">
+            <a:solidFill>
+              <a:srgbClr val="002060"/>
+            </a:solidFill>
+            <a:tailEnd type="stealth" w="lg" len="lg"/>
+          </a:ln>
+        </p:spPr>
+        <p:style>
+          <a:lnRef idx="1">
+            <a:schemeClr val="accent1"/>
+          </a:lnRef>
+          <a:fillRef idx="0">
+            <a:schemeClr val="accent1"/>
+          </a:fillRef>
+          <a:effectRef idx="0">
+            <a:schemeClr val="accent1"/>
+          </a:effectRef>
+          <a:fontRef idx="minor">
+            <a:schemeClr val="tx1"/>
+          </a:fontRef>
+        </p:style>
+      </p:cxnSp>
+      <p:sp>
+        <p:nvSpPr>
+          <p:cNvPr id="13" name="角丸四角形 12"/>
+          <p:cNvSpPr/>
+          <p:nvPr/>
+        </p:nvSpPr>
+        <p:spPr>
+          <a:xfrm>
+            <a:off x="4372792" y="2608983"/>
+            <a:ext cx="729343" cy="424544"/>
+          </a:xfrm>
+          <a:prstGeom prst="roundRect">
+            <a:avLst/>
+          </a:prstGeom>
+          <a:solidFill>
+            <a:srgbClr val="002060"/>
+          </a:solidFill>
+          <a:ln>
+            <a:noFill/>
+          </a:ln>
+        </p:spPr>
+        <p:style>
+          <a:lnRef idx="2">
+            <a:schemeClr val="accent1">
+              <a:shade val="50000"/>
+            </a:schemeClr>
+          </a:lnRef>
+          <a:fillRef idx="1">
+            <a:schemeClr val="accent1"/>
+          </a:fillRef>
+          <a:effectRef idx="0">
+            <a:schemeClr val="accent1"/>
+          </a:effectRef>
+          <a:fontRef idx="minor">
+            <a:schemeClr val="lt1"/>
+          </a:fontRef>
+        </p:style>
+        <p:txBody>
+          <a:bodyPr rtlCol="0" anchor="ctr"/>
+          <a:lstStyle/>
+          <a:p>
+            <a:pPr algn="ctr"/>
+            <a:r>
+              <a:rPr lang="en-US" altLang="ja-JP" sz="3200" dirty="0" smtClean="0"/>
+              <a:t>d3</a:t>
+            </a:r>
+            <a:endParaRPr kumimoji="1" lang="ja-JP" altLang="en-US" sz="3200" dirty="0"/>
+          </a:p>
+        </p:txBody>
+      </p:sp>
+      <p:cxnSp>
+        <p:nvCxnSpPr>
+          <p:cNvPr id="14" name="直線矢印コネクタ 13"/>
+          <p:cNvCxnSpPr>
+            <a:stCxn id="15" idx="1"/>
+          </p:cNvCxnSpPr>
+          <p:nvPr/>
+        </p:nvCxnSpPr>
+        <p:spPr>
+          <a:xfrm flipH="1">
+            <a:off x="3942080" y="3290613"/>
+            <a:ext cx="430712" cy="261232"/>
+          </a:xfrm>
+          <a:prstGeom prst="straightConnector1">
+            <a:avLst/>
+          </a:prstGeom>
+          <a:ln w="28575">
+            <a:solidFill>
+              <a:srgbClr val="002060"/>
+            </a:solidFill>
+            <a:tailEnd type="stealth" w="lg" len="lg"/>
+          </a:ln>
+        </p:spPr>
+        <p:style>
+          <a:lnRef idx="1">
+            <a:schemeClr val="accent1"/>
+          </a:lnRef>
+          <a:fillRef idx="0">
+            <a:schemeClr val="accent1"/>
+          </a:fillRef>
+          <a:effectRef idx="0">
+            <a:schemeClr val="accent1"/>
+          </a:effectRef>
+          <a:fontRef idx="minor">
+            <a:schemeClr val="tx1"/>
+          </a:fontRef>
+        </p:style>
+      </p:cxnSp>
+      <p:sp>
+        <p:nvSpPr>
+          <p:cNvPr id="15" name="角丸四角形 14"/>
+          <p:cNvSpPr/>
+          <p:nvPr/>
+        </p:nvSpPr>
+        <p:spPr>
+          <a:xfrm>
+            <a:off x="4372792" y="3078341"/>
+            <a:ext cx="729343" cy="424544"/>
+          </a:xfrm>
+          <a:prstGeom prst="roundRect">
+            <a:avLst/>
+          </a:prstGeom>
+          <a:solidFill>
+            <a:srgbClr val="002060"/>
+          </a:solidFill>
+          <a:ln>
+            <a:noFill/>
+          </a:ln>
+        </p:spPr>
+        <p:style>
+          <a:lnRef idx="2">
+            <a:schemeClr val="accent1">
+              <a:shade val="50000"/>
+            </a:schemeClr>
+          </a:lnRef>
+          <a:fillRef idx="1">
+            <a:schemeClr val="accent1"/>
+          </a:fillRef>
+          <a:effectRef idx="0">
+            <a:schemeClr val="accent1"/>
+          </a:effectRef>
+          <a:fontRef idx="minor">
+            <a:schemeClr val="lt1"/>
+          </a:fontRef>
+        </p:style>
+        <p:txBody>
+          <a:bodyPr rtlCol="0" anchor="ctr"/>
+          <a:lstStyle/>
+          <a:p>
+            <a:pPr algn="ctr"/>
+            <a:r>
+              <a:rPr lang="en-US" altLang="ja-JP" sz="3200" dirty="0" smtClean="0"/>
+              <a:t>d4</a:t>
+            </a:r>
+            <a:endParaRPr kumimoji="1" lang="ja-JP" altLang="en-US" sz="3200" dirty="0"/>
+          </a:p>
+        </p:txBody>
+      </p:sp>
+      <p:sp>
+        <p:nvSpPr>
+          <p:cNvPr id="17" name="角丸四角形 16"/>
+          <p:cNvSpPr/>
+          <p:nvPr/>
+        </p:nvSpPr>
+        <p:spPr>
+          <a:xfrm>
+            <a:off x="4372792" y="3547699"/>
+            <a:ext cx="729343" cy="424544"/>
+          </a:xfrm>
+          <a:prstGeom prst="roundRect">
+            <a:avLst/>
+          </a:prstGeom>
+          <a:solidFill>
+            <a:srgbClr val="002060"/>
+          </a:solidFill>
+          <a:ln>
+            <a:noFill/>
+          </a:ln>
+        </p:spPr>
+        <p:style>
+          <a:lnRef idx="2">
+            <a:schemeClr val="accent1">
+              <a:shade val="50000"/>
+            </a:schemeClr>
+          </a:lnRef>
+          <a:fillRef idx="1">
+            <a:schemeClr val="accent1"/>
+          </a:fillRef>
+          <a:effectRef idx="0">
+            <a:schemeClr val="accent1"/>
+          </a:effectRef>
+          <a:fontRef idx="minor">
+            <a:schemeClr val="lt1"/>
+          </a:fontRef>
+        </p:style>
+        <p:txBody>
+          <a:bodyPr rtlCol="0" anchor="ctr"/>
+          <a:lstStyle/>
+          <a:p>
+            <a:pPr algn="ctr"/>
+            <a:r>
+              <a:rPr lang="en-US" altLang="ja-JP" sz="3200" dirty="0" smtClean="0"/>
+              <a:t>d5</a:t>
+            </a:r>
+            <a:endParaRPr kumimoji="1" lang="ja-JP" altLang="en-US" sz="3200" dirty="0"/>
+          </a:p>
+        </p:txBody>
+      </p:sp>
+      <p:cxnSp>
+        <p:nvCxnSpPr>
+          <p:cNvPr id="18" name="直線矢印コネクタ 17"/>
+          <p:cNvCxnSpPr>
+            <a:stCxn id="19" idx="1"/>
+          </p:cNvCxnSpPr>
+          <p:nvPr/>
+        </p:nvCxnSpPr>
+        <p:spPr>
+          <a:xfrm flipH="1">
+            <a:off x="3942080" y="4229329"/>
+            <a:ext cx="430712" cy="126985"/>
+          </a:xfrm>
+          <a:prstGeom prst="straightConnector1">
+            <a:avLst/>
+          </a:prstGeom>
+          <a:ln w="28575">
+            <a:solidFill>
+              <a:srgbClr val="002060"/>
+            </a:solidFill>
+            <a:tailEnd type="stealth" w="lg" len="lg"/>
+          </a:ln>
+        </p:spPr>
+        <p:style>
+          <a:lnRef idx="1">
+            <a:schemeClr val="accent1"/>
+          </a:lnRef>
+          <a:fillRef idx="0">
+            <a:schemeClr val="accent1"/>
+          </a:fillRef>
+          <a:effectRef idx="0">
+            <a:schemeClr val="accent1"/>
+          </a:effectRef>
+          <a:fontRef idx="minor">
+            <a:schemeClr val="tx1"/>
+          </a:fontRef>
+        </p:style>
+      </p:cxnSp>
+      <p:sp>
+        <p:nvSpPr>
+          <p:cNvPr id="19" name="角丸四角形 18"/>
+          <p:cNvSpPr/>
+          <p:nvPr/>
+        </p:nvSpPr>
+        <p:spPr>
+          <a:xfrm>
+            <a:off x="4372792" y="4017057"/>
+            <a:ext cx="729343" cy="424544"/>
+          </a:xfrm>
+          <a:prstGeom prst="roundRect">
+            <a:avLst/>
+          </a:prstGeom>
+          <a:solidFill>
+            <a:srgbClr val="002060"/>
+          </a:solidFill>
+          <a:ln>
+            <a:noFill/>
+          </a:ln>
+        </p:spPr>
+        <p:style>
+          <a:lnRef idx="2">
+            <a:schemeClr val="accent1">
+              <a:shade val="50000"/>
+            </a:schemeClr>
+          </a:lnRef>
+          <a:fillRef idx="1">
+            <a:schemeClr val="accent1"/>
+          </a:fillRef>
+          <a:effectRef idx="0">
+            <a:schemeClr val="accent1"/>
+          </a:effectRef>
+          <a:fontRef idx="minor">
+            <a:schemeClr val="lt1"/>
+          </a:fontRef>
+        </p:style>
+        <p:txBody>
+          <a:bodyPr rtlCol="0" anchor="ctr"/>
+          <a:lstStyle/>
+          <a:p>
+            <a:pPr algn="ctr"/>
+            <a:r>
+              <a:rPr lang="en-US" altLang="ja-JP" sz="3200" dirty="0" smtClean="0"/>
+              <a:t>d6</a:t>
+            </a:r>
+            <a:endParaRPr kumimoji="1" lang="ja-JP" altLang="en-US" sz="3200" dirty="0"/>
+          </a:p>
+        </p:txBody>
+      </p:sp>
+      <p:cxnSp>
+        <p:nvCxnSpPr>
+          <p:cNvPr id="21" name="直線矢印コネクタ 20"/>
+          <p:cNvCxnSpPr/>
+          <p:nvPr/>
+        </p:nvCxnSpPr>
+        <p:spPr>
+          <a:xfrm flipH="1">
+            <a:off x="1259840" y="4368484"/>
+            <a:ext cx="359592" cy="427876"/>
+          </a:xfrm>
+          <a:prstGeom prst="straightConnector1">
+            <a:avLst/>
+          </a:prstGeom>
+          <a:ln w="28575">
+            <a:solidFill>
+              <a:srgbClr val="002060"/>
+            </a:solidFill>
+            <a:tailEnd type="stealth" w="lg" len="lg"/>
+          </a:ln>
+        </p:spPr>
+        <p:style>
+          <a:lnRef idx="1">
+            <a:schemeClr val="accent1"/>
+          </a:lnRef>
+          <a:fillRef idx="0">
+            <a:schemeClr val="accent1"/>
+          </a:fillRef>
+          <a:effectRef idx="0">
+            <a:schemeClr val="accent1"/>
+          </a:effectRef>
+          <a:fontRef idx="minor">
+            <a:schemeClr val="tx1"/>
+          </a:fontRef>
+        </p:style>
+      </p:cxnSp>
+      <p:sp>
+        <p:nvSpPr>
+          <p:cNvPr id="22" name="角丸四角形 21"/>
+          <p:cNvSpPr/>
+          <p:nvPr/>
+        </p:nvSpPr>
+        <p:spPr>
+          <a:xfrm>
+            <a:off x="4372792" y="4495469"/>
+            <a:ext cx="729343" cy="424544"/>
+          </a:xfrm>
+          <a:prstGeom prst="roundRect">
+            <a:avLst/>
+          </a:prstGeom>
+          <a:solidFill>
+            <a:srgbClr val="002060"/>
+          </a:solidFill>
+          <a:ln>
+            <a:noFill/>
+          </a:ln>
+        </p:spPr>
+        <p:style>
+          <a:lnRef idx="2">
+            <a:schemeClr val="accent1">
+              <a:shade val="50000"/>
+            </a:schemeClr>
+          </a:lnRef>
+          <a:fillRef idx="1">
+            <a:schemeClr val="accent1"/>
+          </a:fillRef>
+          <a:effectRef idx="0">
+            <a:schemeClr val="accent1"/>
+          </a:effectRef>
+          <a:fontRef idx="minor">
+            <a:schemeClr val="lt1"/>
+          </a:fontRef>
+        </p:style>
+        <p:txBody>
+          <a:bodyPr rtlCol="0" anchor="ctr"/>
+          <a:lstStyle/>
+          <a:p>
+            <a:pPr algn="ctr"/>
+            <a:r>
+              <a:rPr lang="en-US" altLang="ja-JP" sz="3200" dirty="0" smtClean="0"/>
+              <a:t>d8</a:t>
+            </a:r>
+            <a:endParaRPr kumimoji="1" lang="ja-JP" altLang="en-US" sz="3200" dirty="0"/>
+          </a:p>
+        </p:txBody>
+      </p:sp>
+      <p:sp>
+        <p:nvSpPr>
+          <p:cNvPr id="23" name="角丸四角形 22"/>
+          <p:cNvSpPr/>
+          <p:nvPr/>
+        </p:nvSpPr>
+        <p:spPr>
+          <a:xfrm>
+            <a:off x="1619432" y="4144042"/>
+            <a:ext cx="729343" cy="424544"/>
+          </a:xfrm>
+          <a:prstGeom prst="roundRect">
+            <a:avLst/>
+          </a:prstGeom>
+          <a:solidFill>
+            <a:srgbClr val="002060"/>
+          </a:solidFill>
+          <a:ln>
+            <a:noFill/>
+          </a:ln>
+        </p:spPr>
+        <p:style>
+          <a:lnRef idx="2">
+            <a:schemeClr val="accent1">
+              <a:shade val="50000"/>
+            </a:schemeClr>
+          </a:lnRef>
+          <a:fillRef idx="1">
+            <a:schemeClr val="accent1"/>
+          </a:fillRef>
+          <a:effectRef idx="0">
+            <a:schemeClr val="accent1"/>
+          </a:effectRef>
+          <a:fontRef idx="minor">
+            <a:schemeClr val="lt1"/>
+          </a:fontRef>
+        </p:style>
+        <p:txBody>
+          <a:bodyPr rtlCol="0" anchor="ctr"/>
+          <a:lstStyle/>
+          <a:p>
+            <a:pPr algn="ctr"/>
+            <a:r>
+              <a:rPr lang="en-US" altLang="ja-JP" sz="3200" dirty="0" smtClean="0"/>
+              <a:t>d7</a:t>
+            </a:r>
+            <a:endParaRPr kumimoji="1" lang="ja-JP" altLang="en-US" sz="3200" dirty="0"/>
+          </a:p>
+        </p:txBody>
+      </p:sp>
+      <p:cxnSp>
+        <p:nvCxnSpPr>
+          <p:cNvPr id="25" name="直線矢印コネクタ 24"/>
+          <p:cNvCxnSpPr/>
+          <p:nvPr/>
+        </p:nvCxnSpPr>
+        <p:spPr>
+          <a:xfrm flipH="1">
+            <a:off x="3942080" y="4644248"/>
+            <a:ext cx="430712" cy="126985"/>
+          </a:xfrm>
+          <a:prstGeom prst="straightConnector1">
+            <a:avLst/>
+          </a:prstGeom>
+          <a:ln w="28575">
+            <a:solidFill>
+              <a:srgbClr val="002060"/>
+            </a:solidFill>
+            <a:tailEnd type="stealth" w="lg" len="lg"/>
+          </a:ln>
+        </p:spPr>
+        <p:style>
+          <a:lnRef idx="1">
+            <a:schemeClr val="accent1"/>
+          </a:lnRef>
+          <a:fillRef idx="0">
+            <a:schemeClr val="accent1"/>
+          </a:fillRef>
+          <a:effectRef idx="0">
+            <a:schemeClr val="accent1"/>
+          </a:effectRef>
+          <a:fontRef idx="minor">
+            <a:schemeClr val="tx1"/>
+          </a:fontRef>
+        </p:style>
+      </p:cxnSp>
+      <p:cxnSp>
+        <p:nvCxnSpPr>
+          <p:cNvPr id="26" name="直線矢印コネクタ 25"/>
+          <p:cNvCxnSpPr/>
+          <p:nvPr/>
+        </p:nvCxnSpPr>
+        <p:spPr>
+          <a:xfrm flipH="1">
+            <a:off x="3942080" y="3780659"/>
+            <a:ext cx="430712" cy="126985"/>
+          </a:xfrm>
+          <a:prstGeom prst="straightConnector1">
+            <a:avLst/>
+          </a:prstGeom>
+          <a:ln w="28575">
+            <a:solidFill>
+              <a:srgbClr val="002060"/>
+            </a:solidFill>
+            <a:tailEnd type="stealth" w="lg" len="lg"/>
+          </a:ln>
+        </p:spPr>
+        <p:style>
+          <a:lnRef idx="1">
+            <a:schemeClr val="accent1"/>
+          </a:lnRef>
+          <a:fillRef idx="0">
+            <a:schemeClr val="accent1"/>
+          </a:fillRef>
+          <a:effectRef idx="0">
+            <a:schemeClr val="accent1"/>
+          </a:effectRef>
+          <a:fontRef idx="minor">
+            <a:schemeClr val="tx1"/>
+          </a:fontRef>
+        </p:style>
+      </p:cxnSp>
+    </p:spTree>
+    <p:extLst>
+      <p:ext uri="{BB962C8B-B14F-4D97-AF65-F5344CB8AC3E}">
+        <p14:creationId xmlns:p14="http://schemas.microsoft.com/office/powerpoint/2010/main" val="4061723166"/>
+      </p:ext>
+    </p:extLst>
+  </p:cSld>
+  <p:clrMapOvr>
+    <a:masterClrMapping/>
+  </p:clrMapOvr>
+</p:sld>
+</file>
+
+<file path=ppt/slides/slide4.xml><?xml version="1.0" encoding="utf-8"?>
+<p:sld xmlns:a="http://schemas.openxmlformats.org/drawingml/2006/main" xmlns:r="http://schemas.openxmlformats.org/officeDocument/2006/relationships" xmlns:p="http://schemas.openxmlformats.org/presentationml/2006/main">
+  <p:cSld>
+    <p:spTree>
+      <p:nvGrpSpPr>
+        <p:cNvPr id="1" name=""/>
+        <p:cNvGrpSpPr/>
+        <p:nvPr/>
+      </p:nvGrpSpPr>
+      <p:grpSpPr>
+        <a:xfrm>
+          <a:off x="0" y="0"/>
+          <a:ext cx="0" cy="0"/>
+          <a:chOff x="0" y="0"/>
+          <a:chExt cx="0" cy="0"/>
+        </a:xfrm>
+      </p:grpSpPr>
+      <p:grpSp>
+        <p:nvGrpSpPr>
+          <p:cNvPr id="8" name="グループ化 7"/>
+          <p:cNvGrpSpPr/>
+          <p:nvPr/>
+        </p:nvGrpSpPr>
+        <p:grpSpPr>
+          <a:xfrm>
+            <a:off x="1447800" y="754380"/>
+            <a:ext cx="8170721" cy="4991100"/>
+            <a:chOff x="1447800" y="754380"/>
+            <a:chExt cx="8170721" cy="4991100"/>
+          </a:xfrm>
+        </p:grpSpPr>
+        <p:pic>
+          <p:nvPicPr>
+            <p:cNvPr id="4" name="図 3"/>
+            <p:cNvPicPr>
+              <a:picLocks noChangeAspect="1"/>
+            </p:cNvPicPr>
+            <p:nvPr/>
+          </p:nvPicPr>
+          <p:blipFill rotWithShape="1">
+            <a:blip r:embed="rId2"/>
+            <a:srcRect l="20000" r="8584" b="22445"/>
+            <a:stretch/>
+          </p:blipFill>
+          <p:spPr>
+            <a:xfrm>
+              <a:off x="1447800" y="754380"/>
+              <a:ext cx="8170721" cy="4991100"/>
+            </a:xfrm>
+            <a:prstGeom prst="rect">
+              <a:avLst/>
+            </a:prstGeom>
+          </p:spPr>
+        </p:pic>
+        <p:sp>
+          <p:nvSpPr>
+            <p:cNvPr id="5" name="角丸四角形 4"/>
+            <p:cNvSpPr/>
+            <p:nvPr/>
+          </p:nvSpPr>
+          <p:spPr>
+            <a:xfrm>
+              <a:off x="1594711" y="1348534"/>
+              <a:ext cx="853849" cy="703786"/>
+            </a:xfrm>
+            <a:prstGeom prst="roundRect">
+              <a:avLst/>
+            </a:prstGeom>
+            <a:solidFill>
+              <a:srgbClr val="002060"/>
+            </a:solidFill>
+            <a:ln w="28575">
+              <a:solidFill>
+                <a:schemeClr val="bg1"/>
+              </a:solidFill>
+            </a:ln>
+          </p:spPr>
+          <p:style>
+            <a:lnRef idx="2">
+              <a:schemeClr val="accent1">
+                <a:shade val="50000"/>
+              </a:schemeClr>
+            </a:lnRef>
+            <a:fillRef idx="1">
+              <a:schemeClr val="accent1"/>
+            </a:fillRef>
+            <a:effectRef idx="0">
+              <a:schemeClr val="accent1"/>
+            </a:effectRef>
+            <a:fontRef idx="minor">
+              <a:schemeClr val="lt1"/>
+            </a:fontRef>
+          </p:style>
+          <p:txBody>
+            <a:bodyPr rtlCol="0" anchor="ctr"/>
+            <a:lstStyle/>
+            <a:p>
+              <a:pPr algn="ctr"/>
+              <a:r>
+                <a:rPr lang="en-US" altLang="ja-JP" sz="4400" dirty="0" smtClean="0"/>
+                <a:t>d1</a:t>
+              </a:r>
+              <a:endParaRPr kumimoji="1" lang="ja-JP" altLang="en-US" sz="4400" dirty="0"/>
+            </a:p>
+          </p:txBody>
+        </p:sp>
+        <p:sp>
+          <p:nvSpPr>
+            <p:cNvPr id="6" name="角丸四角形 5"/>
+            <p:cNvSpPr/>
+            <p:nvPr/>
+          </p:nvSpPr>
+          <p:spPr>
+            <a:xfrm>
+              <a:off x="8645751" y="3146854"/>
+              <a:ext cx="853849" cy="703786"/>
+            </a:xfrm>
+            <a:prstGeom prst="roundRect">
+              <a:avLst/>
+            </a:prstGeom>
+            <a:solidFill>
+              <a:srgbClr val="002060"/>
+            </a:solidFill>
+            <a:ln w="28575">
+              <a:solidFill>
+                <a:schemeClr val="bg1"/>
+              </a:solidFill>
+            </a:ln>
+          </p:spPr>
+          <p:style>
+            <a:lnRef idx="2">
+              <a:schemeClr val="accent1">
+                <a:shade val="50000"/>
+              </a:schemeClr>
+            </a:lnRef>
+            <a:fillRef idx="1">
+              <a:schemeClr val="accent1"/>
+            </a:fillRef>
+            <a:effectRef idx="0">
+              <a:schemeClr val="accent1"/>
+            </a:effectRef>
+            <a:fontRef idx="minor">
+              <a:schemeClr val="lt1"/>
+            </a:fontRef>
+          </p:style>
+          <p:txBody>
+            <a:bodyPr rtlCol="0" anchor="ctr"/>
+            <a:lstStyle/>
+            <a:p>
+              <a:pPr algn="ctr"/>
+              <a:r>
+                <a:rPr lang="en-US" altLang="ja-JP" sz="4400" dirty="0" smtClean="0"/>
+                <a:t>d2</a:t>
+              </a:r>
+              <a:endParaRPr kumimoji="1" lang="ja-JP" altLang="en-US" sz="4400" dirty="0"/>
+            </a:p>
+          </p:txBody>
+        </p:sp>
+        <p:sp>
+          <p:nvSpPr>
+            <p:cNvPr id="7" name="角丸四角形 6"/>
+            <p:cNvSpPr/>
+            <p:nvPr/>
+          </p:nvSpPr>
+          <p:spPr>
+            <a:xfrm>
+              <a:off x="8635591" y="4446167"/>
+              <a:ext cx="853849" cy="703786"/>
+            </a:xfrm>
+            <a:prstGeom prst="roundRect">
+              <a:avLst/>
+            </a:prstGeom>
+            <a:solidFill>
+              <a:srgbClr val="002060"/>
+            </a:solidFill>
+            <a:ln w="28575">
+              <a:solidFill>
+                <a:schemeClr val="bg1"/>
+              </a:solidFill>
+            </a:ln>
+          </p:spPr>
+          <p:style>
+            <a:lnRef idx="2">
+              <a:schemeClr val="accent1">
+                <a:shade val="50000"/>
+              </a:schemeClr>
+            </a:lnRef>
+            <a:fillRef idx="1">
+              <a:schemeClr val="accent1"/>
+            </a:fillRef>
+            <a:effectRef idx="0">
+              <a:schemeClr val="accent1"/>
+            </a:effectRef>
+            <a:fontRef idx="minor">
+              <a:schemeClr val="lt1"/>
+            </a:fontRef>
+          </p:style>
+          <p:txBody>
+            <a:bodyPr rtlCol="0" anchor="ctr"/>
+            <a:lstStyle/>
+            <a:p>
+              <a:pPr algn="ctr"/>
+              <a:r>
+                <a:rPr lang="en-US" altLang="ja-JP" sz="4400" dirty="0" smtClean="0"/>
+                <a:t>d2</a:t>
+              </a:r>
+              <a:endParaRPr kumimoji="1" lang="ja-JP" altLang="en-US" sz="4400" dirty="0"/>
+            </a:p>
+          </p:txBody>
+        </p:sp>
+      </p:grpSp>
+    </p:spTree>
+    <p:extLst>
+      <p:ext uri="{BB962C8B-B14F-4D97-AF65-F5344CB8AC3E}">
+        <p14:creationId xmlns:p14="http://schemas.microsoft.com/office/powerpoint/2010/main" val="3099797381"/>
+      </p:ext>
+    </p:extLst>
+  </p:cSld>
+  <p:clrMapOvr>
+    <a:masterClrMapping/>
+  </p:clrMapOvr>
+</p:sld>
+</file>
+
+<file path=ppt/slides/slide5.xml><?xml version="1.0" encoding="utf-8"?>
+<p:sld xmlns:a="http://schemas.openxmlformats.org/drawingml/2006/main" xmlns:r="http://schemas.openxmlformats.org/officeDocument/2006/relationships" xmlns:p="http://schemas.openxmlformats.org/presentationml/2006/main">
+  <p:cSld>
+    <p:spTree>
+      <p:nvGrpSpPr>
+        <p:cNvPr id="1" name=""/>
+        <p:cNvGrpSpPr/>
+        <p:nvPr/>
+      </p:nvGrpSpPr>
+      <p:grpSpPr>
+        <a:xfrm>
+          <a:off x="0" y="0"/>
+          <a:ext cx="0" cy="0"/>
+          <a:chOff x="0" y="0"/>
+          <a:chExt cx="0" cy="0"/>
+        </a:xfrm>
+      </p:grpSpPr>
+      <p:grpSp>
+        <p:nvGrpSpPr>
+          <p:cNvPr id="3" name="グループ化 2"/>
+          <p:cNvGrpSpPr/>
+          <p:nvPr/>
+        </p:nvGrpSpPr>
+        <p:grpSpPr>
+          <a:xfrm>
+            <a:off x="1141956" y="836377"/>
+            <a:ext cx="4344445" cy="5210175"/>
+            <a:chOff x="1141956" y="836377"/>
+            <a:chExt cx="4344445" cy="5210175"/>
+          </a:xfrm>
+        </p:grpSpPr>
+        <p:pic>
+          <p:nvPicPr>
+            <p:cNvPr id="2" name="図 1"/>
+            <p:cNvPicPr>
+              <a:picLocks noChangeAspect="1"/>
+            </p:cNvPicPr>
+            <p:nvPr/>
+          </p:nvPicPr>
+          <p:blipFill>
+            <a:blip r:embed="rId2"/>
+            <a:stretch>
+              <a:fillRect/>
+            </a:stretch>
+          </p:blipFill>
+          <p:spPr>
+            <a:xfrm>
+              <a:off x="1141956" y="836377"/>
+              <a:ext cx="3571875" cy="5210175"/>
+            </a:xfrm>
+            <a:prstGeom prst="rect">
+              <a:avLst/>
+            </a:prstGeom>
+          </p:spPr>
+        </p:pic>
+        <p:grpSp>
+          <p:nvGrpSpPr>
+            <p:cNvPr id="39" name="グループ化 38"/>
+            <p:cNvGrpSpPr/>
+            <p:nvPr/>
+          </p:nvGrpSpPr>
+          <p:grpSpPr>
+            <a:xfrm>
+              <a:off x="1704439" y="1094534"/>
+              <a:ext cx="3781962" cy="4613661"/>
+              <a:chOff x="1704439" y="1094534"/>
+              <a:chExt cx="3781962" cy="4613661"/>
+            </a:xfrm>
+          </p:grpSpPr>
+          <p:cxnSp>
+            <p:nvCxnSpPr>
+              <p:cNvPr id="5" name="直線矢印コネクタ 4"/>
+              <p:cNvCxnSpPr>
+                <a:stCxn id="6" idx="1"/>
+              </p:cNvCxnSpPr>
+              <p:nvPr/>
+            </p:nvCxnSpPr>
+            <p:spPr>
+              <a:xfrm flipH="1">
+                <a:off x="4346449" y="1239163"/>
+                <a:ext cx="418182" cy="144629"/>
+              </a:xfrm>
+              <a:prstGeom prst="straightConnector1">
+                <a:avLst/>
+              </a:prstGeom>
+              <a:ln w="28575">
+                <a:solidFill>
+                  <a:srgbClr val="002060"/>
+                </a:solidFill>
+                <a:tailEnd type="stealth" w="lg" len="lg"/>
+              </a:ln>
+            </p:spPr>
+            <p:style>
+              <a:lnRef idx="1">
+                <a:schemeClr val="accent1"/>
+              </a:lnRef>
+              <a:fillRef idx="0">
+                <a:schemeClr val="accent1"/>
+              </a:fillRef>
+              <a:effectRef idx="0">
+                <a:schemeClr val="accent1"/>
+              </a:effectRef>
+              <a:fontRef idx="minor">
+                <a:schemeClr val="tx1"/>
+              </a:fontRef>
+            </p:style>
+          </p:cxnSp>
+          <p:sp>
+            <p:nvSpPr>
+              <p:cNvPr id="6" name="角丸四角形 5"/>
+              <p:cNvSpPr/>
+              <p:nvPr/>
+            </p:nvSpPr>
+            <p:spPr>
+              <a:xfrm>
+                <a:off x="4764631" y="1094534"/>
+                <a:ext cx="593754" cy="289258"/>
+              </a:xfrm>
+              <a:prstGeom prst="roundRect">
+                <a:avLst/>
+              </a:prstGeom>
+              <a:solidFill>
+                <a:srgbClr val="002060"/>
+              </a:solidFill>
+              <a:ln>
+                <a:noFill/>
+              </a:ln>
+            </p:spPr>
+            <p:style>
+              <a:lnRef idx="2">
+                <a:schemeClr val="accent1">
+                  <a:shade val="50000"/>
+                </a:schemeClr>
+              </a:lnRef>
+              <a:fillRef idx="1">
+                <a:schemeClr val="accent1"/>
+              </a:fillRef>
+              <a:effectRef idx="0">
+                <a:schemeClr val="accent1"/>
+              </a:effectRef>
+              <a:fontRef idx="minor">
+                <a:schemeClr val="lt1"/>
+              </a:fontRef>
+            </p:style>
+            <p:txBody>
+              <a:bodyPr rtlCol="0" anchor="ctr"/>
+              <a:lstStyle/>
+              <a:p>
+                <a:pPr algn="ctr"/>
+                <a:r>
+                  <a:rPr lang="en-US" altLang="ja-JP" sz="2400" dirty="0" smtClean="0"/>
+                  <a:t>d1</a:t>
+                </a:r>
+                <a:endParaRPr kumimoji="1" lang="ja-JP" altLang="en-US" sz="2400" dirty="0"/>
+              </a:p>
+            </p:txBody>
+          </p:sp>
+          <p:cxnSp>
+            <p:nvCxnSpPr>
+              <p:cNvPr id="10" name="直線矢印コネクタ 9"/>
+              <p:cNvCxnSpPr>
+                <a:stCxn id="11" idx="1"/>
+              </p:cNvCxnSpPr>
+              <p:nvPr/>
+            </p:nvCxnSpPr>
+            <p:spPr>
+              <a:xfrm flipH="1">
+                <a:off x="4346449" y="1552805"/>
+                <a:ext cx="418182" cy="144629"/>
+              </a:xfrm>
+              <a:prstGeom prst="straightConnector1">
+                <a:avLst/>
+              </a:prstGeom>
+              <a:ln w="28575">
+                <a:solidFill>
+                  <a:srgbClr val="002060"/>
+                </a:solidFill>
+                <a:tailEnd type="stealth" w="lg" len="lg"/>
+              </a:ln>
+            </p:spPr>
+            <p:style>
+              <a:lnRef idx="1">
+                <a:schemeClr val="accent1"/>
+              </a:lnRef>
+              <a:fillRef idx="0">
+                <a:schemeClr val="accent1"/>
+              </a:fillRef>
+              <a:effectRef idx="0">
+                <a:schemeClr val="accent1"/>
+              </a:effectRef>
+              <a:fontRef idx="minor">
+                <a:schemeClr val="tx1"/>
+              </a:fontRef>
+            </p:style>
+          </p:cxnSp>
+          <p:sp>
+            <p:nvSpPr>
+              <p:cNvPr id="11" name="角丸四角形 10"/>
+              <p:cNvSpPr/>
+              <p:nvPr/>
+            </p:nvSpPr>
+            <p:spPr>
+              <a:xfrm>
+                <a:off x="4764631" y="1408176"/>
+                <a:ext cx="593754" cy="289258"/>
+              </a:xfrm>
+              <a:prstGeom prst="roundRect">
+                <a:avLst/>
+              </a:prstGeom>
+              <a:solidFill>
+                <a:srgbClr val="002060"/>
+              </a:solidFill>
+              <a:ln>
+                <a:noFill/>
+              </a:ln>
+            </p:spPr>
+            <p:style>
+              <a:lnRef idx="2">
+                <a:schemeClr val="accent1">
+                  <a:shade val="50000"/>
+                </a:schemeClr>
+              </a:lnRef>
+              <a:fillRef idx="1">
+                <a:schemeClr val="accent1"/>
+              </a:fillRef>
+              <a:effectRef idx="0">
+                <a:schemeClr val="accent1"/>
+              </a:effectRef>
+              <a:fontRef idx="minor">
+                <a:schemeClr val="lt1"/>
+              </a:fontRef>
+            </p:style>
+            <p:txBody>
+              <a:bodyPr rtlCol="0" anchor="ctr"/>
+              <a:lstStyle/>
+              <a:p>
+                <a:pPr algn="ctr"/>
+                <a:r>
+                  <a:rPr lang="en-US" altLang="ja-JP" sz="2400" dirty="0" smtClean="0"/>
+                  <a:t>d2</a:t>
+                </a:r>
+                <a:endParaRPr kumimoji="1" lang="ja-JP" altLang="en-US" sz="2400" dirty="0"/>
+              </a:p>
+            </p:txBody>
+          </p:sp>
+          <p:cxnSp>
+            <p:nvCxnSpPr>
+              <p:cNvPr id="12" name="直線矢印コネクタ 11"/>
+              <p:cNvCxnSpPr>
+                <a:stCxn id="13" idx="1"/>
+              </p:cNvCxnSpPr>
+              <p:nvPr/>
+            </p:nvCxnSpPr>
+            <p:spPr>
+              <a:xfrm flipH="1">
+                <a:off x="4346449" y="1893577"/>
+                <a:ext cx="418182" cy="144629"/>
+              </a:xfrm>
+              <a:prstGeom prst="straightConnector1">
+                <a:avLst/>
+              </a:prstGeom>
+              <a:ln w="28575">
+                <a:solidFill>
+                  <a:srgbClr val="002060"/>
+                </a:solidFill>
+                <a:tailEnd type="stealth" w="lg" len="lg"/>
+              </a:ln>
+            </p:spPr>
+            <p:style>
+              <a:lnRef idx="1">
+                <a:schemeClr val="accent1"/>
+              </a:lnRef>
+              <a:fillRef idx="0">
+                <a:schemeClr val="accent1"/>
+              </a:fillRef>
+              <a:effectRef idx="0">
+                <a:schemeClr val="accent1"/>
+              </a:effectRef>
+              <a:fontRef idx="minor">
+                <a:schemeClr val="tx1"/>
+              </a:fontRef>
+            </p:style>
+          </p:cxnSp>
+          <p:sp>
+            <p:nvSpPr>
+              <p:cNvPr id="13" name="角丸四角形 12"/>
+              <p:cNvSpPr/>
+              <p:nvPr/>
+            </p:nvSpPr>
+            <p:spPr>
+              <a:xfrm>
+                <a:off x="4764631" y="1748948"/>
+                <a:ext cx="593754" cy="289258"/>
+              </a:xfrm>
+              <a:prstGeom prst="roundRect">
+                <a:avLst/>
+              </a:prstGeom>
+              <a:solidFill>
+                <a:srgbClr val="002060"/>
+              </a:solidFill>
+              <a:ln>
+                <a:noFill/>
+              </a:ln>
+            </p:spPr>
+            <p:style>
+              <a:lnRef idx="2">
+                <a:schemeClr val="accent1">
+                  <a:shade val="50000"/>
+                </a:schemeClr>
+              </a:lnRef>
+              <a:fillRef idx="1">
+                <a:schemeClr val="accent1"/>
+              </a:fillRef>
+              <a:effectRef idx="0">
+                <a:schemeClr val="accent1"/>
+              </a:effectRef>
+              <a:fontRef idx="minor">
+                <a:schemeClr val="lt1"/>
+              </a:fontRef>
+            </p:style>
+            <p:txBody>
+              <a:bodyPr rtlCol="0" anchor="ctr"/>
+              <a:lstStyle/>
+              <a:p>
+                <a:pPr algn="ctr"/>
+                <a:r>
+                  <a:rPr lang="en-US" altLang="ja-JP" sz="2400" dirty="0" smtClean="0"/>
+                  <a:t>d3</a:t>
+                </a:r>
+                <a:endParaRPr kumimoji="1" lang="ja-JP" altLang="en-US" sz="2400" dirty="0"/>
+              </a:p>
+            </p:txBody>
+          </p:sp>
+          <p:cxnSp>
+            <p:nvCxnSpPr>
+              <p:cNvPr id="14" name="直線矢印コネクタ 13"/>
+              <p:cNvCxnSpPr>
+                <a:stCxn id="15" idx="1"/>
+              </p:cNvCxnSpPr>
+              <p:nvPr/>
+            </p:nvCxnSpPr>
+            <p:spPr>
+              <a:xfrm flipH="1">
+                <a:off x="4346449" y="2207219"/>
+                <a:ext cx="418182" cy="144629"/>
+              </a:xfrm>
+              <a:prstGeom prst="straightConnector1">
+                <a:avLst/>
+              </a:prstGeom>
+              <a:ln w="28575">
+                <a:solidFill>
+                  <a:srgbClr val="002060"/>
+                </a:solidFill>
+                <a:tailEnd type="stealth" w="lg" len="lg"/>
+              </a:ln>
+            </p:spPr>
+            <p:style>
+              <a:lnRef idx="1">
+                <a:schemeClr val="accent1"/>
+              </a:lnRef>
+              <a:fillRef idx="0">
+                <a:schemeClr val="accent1"/>
+              </a:fillRef>
+              <a:effectRef idx="0">
+                <a:schemeClr val="accent1"/>
+              </a:effectRef>
+              <a:fontRef idx="minor">
+                <a:schemeClr val="tx1"/>
+              </a:fontRef>
+            </p:style>
+          </p:cxnSp>
+          <p:sp>
+            <p:nvSpPr>
+              <p:cNvPr id="15" name="角丸四角形 14"/>
+              <p:cNvSpPr/>
+              <p:nvPr/>
+            </p:nvSpPr>
+            <p:spPr>
+              <a:xfrm>
+                <a:off x="4764631" y="2062590"/>
+                <a:ext cx="593754" cy="289258"/>
+              </a:xfrm>
+              <a:prstGeom prst="roundRect">
+                <a:avLst/>
+              </a:prstGeom>
+              <a:solidFill>
+                <a:srgbClr val="002060"/>
+              </a:solidFill>
+              <a:ln>
+                <a:noFill/>
+              </a:ln>
+            </p:spPr>
+            <p:style>
+              <a:lnRef idx="2">
+                <a:schemeClr val="accent1">
+                  <a:shade val="50000"/>
+                </a:schemeClr>
+              </a:lnRef>
+              <a:fillRef idx="1">
+                <a:schemeClr val="accent1"/>
+              </a:fillRef>
+              <a:effectRef idx="0">
+                <a:schemeClr val="accent1"/>
+              </a:effectRef>
+              <a:fontRef idx="minor">
+                <a:schemeClr val="lt1"/>
+              </a:fontRef>
+            </p:style>
+            <p:txBody>
+              <a:bodyPr rtlCol="0" anchor="ctr"/>
+              <a:lstStyle/>
+              <a:p>
+                <a:pPr algn="ctr"/>
+                <a:r>
+                  <a:rPr lang="en-US" altLang="ja-JP" sz="2400" dirty="0" smtClean="0"/>
+                  <a:t>d4</a:t>
+                </a:r>
+                <a:endParaRPr kumimoji="1" lang="ja-JP" altLang="en-US" sz="2400" dirty="0"/>
+              </a:p>
+            </p:txBody>
+          </p:sp>
+          <p:cxnSp>
+            <p:nvCxnSpPr>
+              <p:cNvPr id="16" name="直線矢印コネクタ 15"/>
+              <p:cNvCxnSpPr>
+                <a:stCxn id="17" idx="1"/>
+              </p:cNvCxnSpPr>
+              <p:nvPr/>
+            </p:nvCxnSpPr>
+            <p:spPr>
+              <a:xfrm flipH="1">
+                <a:off x="4523232" y="2753950"/>
+                <a:ext cx="369415" cy="7538"/>
+              </a:xfrm>
+              <a:prstGeom prst="straightConnector1">
+                <a:avLst/>
+              </a:prstGeom>
+              <a:ln w="28575">
+                <a:solidFill>
+                  <a:srgbClr val="002060"/>
+                </a:solidFill>
+                <a:tailEnd type="stealth" w="lg" len="lg"/>
+              </a:ln>
+            </p:spPr>
+            <p:style>
+              <a:lnRef idx="1">
+                <a:schemeClr val="accent1"/>
+              </a:lnRef>
+              <a:fillRef idx="0">
+                <a:schemeClr val="accent1"/>
+              </a:fillRef>
+              <a:effectRef idx="0">
+                <a:schemeClr val="accent1"/>
+              </a:effectRef>
+              <a:fontRef idx="minor">
+                <a:schemeClr val="tx1"/>
+              </a:fontRef>
+            </p:style>
+          </p:cxnSp>
+          <p:sp>
+            <p:nvSpPr>
+              <p:cNvPr id="17" name="角丸四角形 16"/>
+              <p:cNvSpPr/>
+              <p:nvPr/>
+            </p:nvSpPr>
+            <p:spPr>
+              <a:xfrm>
+                <a:off x="4892647" y="2575724"/>
+                <a:ext cx="593754" cy="356451"/>
+              </a:xfrm>
+              <a:prstGeom prst="roundRect">
+                <a:avLst/>
+              </a:prstGeom>
+              <a:solidFill>
+                <a:srgbClr val="002060"/>
+              </a:solidFill>
+              <a:ln>
+                <a:noFill/>
+              </a:ln>
+            </p:spPr>
+            <p:style>
+              <a:lnRef idx="2">
+                <a:schemeClr val="accent1">
+                  <a:shade val="50000"/>
+                </a:schemeClr>
+              </a:lnRef>
+              <a:fillRef idx="1">
+                <a:schemeClr val="accent1"/>
+              </a:fillRef>
+              <a:effectRef idx="0">
+                <a:schemeClr val="accent1"/>
+              </a:effectRef>
+              <a:fontRef idx="minor">
+                <a:schemeClr val="lt1"/>
+              </a:fontRef>
+            </p:style>
+            <p:txBody>
+              <a:bodyPr rtlCol="0" anchor="ctr"/>
+              <a:lstStyle/>
+              <a:p>
+                <a:pPr algn="ctr"/>
+                <a:r>
+                  <a:rPr lang="en-US" altLang="ja-JP" sz="2400" dirty="0" smtClean="0"/>
+                  <a:t>d5</a:t>
+                </a:r>
+                <a:endParaRPr kumimoji="1" lang="ja-JP" altLang="en-US" sz="2400" dirty="0"/>
+              </a:p>
+            </p:txBody>
+          </p:sp>
+          <p:cxnSp>
+            <p:nvCxnSpPr>
+              <p:cNvPr id="20" name="直線矢印コネクタ 19"/>
+              <p:cNvCxnSpPr>
+                <a:stCxn id="21" idx="1"/>
+              </p:cNvCxnSpPr>
+              <p:nvPr/>
+            </p:nvCxnSpPr>
+            <p:spPr>
+              <a:xfrm flipH="1">
+                <a:off x="4187952" y="3199658"/>
+                <a:ext cx="582775" cy="0"/>
+              </a:xfrm>
+              <a:prstGeom prst="straightConnector1">
+                <a:avLst/>
+              </a:prstGeom>
+              <a:ln w="28575">
+                <a:solidFill>
+                  <a:srgbClr val="002060"/>
+                </a:solidFill>
+                <a:tailEnd type="stealth" w="lg" len="lg"/>
+              </a:ln>
+            </p:spPr>
+            <p:style>
+              <a:lnRef idx="1">
+                <a:schemeClr val="accent1"/>
+              </a:lnRef>
+              <a:fillRef idx="0">
+                <a:schemeClr val="accent1"/>
+              </a:fillRef>
+              <a:effectRef idx="0">
+                <a:schemeClr val="accent1"/>
+              </a:effectRef>
+              <a:fontRef idx="minor">
+                <a:schemeClr val="tx1"/>
+              </a:fontRef>
+            </p:style>
+          </p:cxnSp>
+          <p:sp>
+            <p:nvSpPr>
+              <p:cNvPr id="21" name="角丸四角形 20"/>
+              <p:cNvSpPr/>
+              <p:nvPr/>
+            </p:nvSpPr>
+            <p:spPr>
+              <a:xfrm>
+                <a:off x="4770727" y="3055789"/>
+                <a:ext cx="593754" cy="287737"/>
+              </a:xfrm>
+              <a:prstGeom prst="roundRect">
+                <a:avLst/>
+              </a:prstGeom>
+              <a:solidFill>
+                <a:srgbClr val="002060"/>
+              </a:solidFill>
+              <a:ln>
+                <a:noFill/>
+              </a:ln>
+            </p:spPr>
+            <p:style>
+              <a:lnRef idx="2">
+                <a:schemeClr val="accent1">
+                  <a:shade val="50000"/>
+                </a:schemeClr>
+              </a:lnRef>
+              <a:fillRef idx="1">
+                <a:schemeClr val="accent1"/>
+              </a:fillRef>
+              <a:effectRef idx="0">
+                <a:schemeClr val="accent1"/>
+              </a:effectRef>
+              <a:fontRef idx="minor">
+                <a:schemeClr val="lt1"/>
+              </a:fontRef>
+            </p:style>
+            <p:txBody>
+              <a:bodyPr rtlCol="0" anchor="ctr"/>
+              <a:lstStyle/>
+              <a:p>
+                <a:pPr algn="ctr"/>
+                <a:r>
+                  <a:rPr lang="en-US" altLang="ja-JP" sz="2400" dirty="0" smtClean="0"/>
+                  <a:t>d6</a:t>
+                </a:r>
+                <a:endParaRPr kumimoji="1" lang="ja-JP" altLang="en-US" sz="2400" dirty="0"/>
+              </a:p>
+            </p:txBody>
+          </p:sp>
+          <p:cxnSp>
+            <p:nvCxnSpPr>
+              <p:cNvPr id="32" name="直線矢印コネクタ 31"/>
+              <p:cNvCxnSpPr>
+                <a:stCxn id="33" idx="1"/>
+              </p:cNvCxnSpPr>
+              <p:nvPr/>
+            </p:nvCxnSpPr>
+            <p:spPr>
+              <a:xfrm flipH="1">
+                <a:off x="4242816" y="3514214"/>
+                <a:ext cx="527911" cy="0"/>
+              </a:xfrm>
+              <a:prstGeom prst="straightConnector1">
+                <a:avLst/>
+              </a:prstGeom>
+              <a:ln w="28575">
+                <a:solidFill>
+                  <a:srgbClr val="002060"/>
+                </a:solidFill>
+                <a:tailEnd type="stealth" w="lg" len="lg"/>
+              </a:ln>
+            </p:spPr>
+            <p:style>
+              <a:lnRef idx="1">
+                <a:schemeClr val="accent1"/>
+              </a:lnRef>
+              <a:fillRef idx="0">
+                <a:schemeClr val="accent1"/>
+              </a:fillRef>
+              <a:effectRef idx="0">
+                <a:schemeClr val="accent1"/>
+              </a:effectRef>
+              <a:fontRef idx="minor">
+                <a:schemeClr val="tx1"/>
+              </a:fontRef>
+            </p:style>
+          </p:cxnSp>
+          <p:sp>
+            <p:nvSpPr>
+              <p:cNvPr id="33" name="角丸四角形 32"/>
+              <p:cNvSpPr/>
+              <p:nvPr/>
+            </p:nvSpPr>
+            <p:spPr>
+              <a:xfrm>
+                <a:off x="4770727" y="3370345"/>
+                <a:ext cx="593754" cy="287737"/>
+              </a:xfrm>
+              <a:prstGeom prst="roundRect">
+                <a:avLst/>
+              </a:prstGeom>
+              <a:solidFill>
+                <a:srgbClr val="002060"/>
+              </a:solidFill>
+              <a:ln>
+                <a:noFill/>
+              </a:ln>
+            </p:spPr>
+            <p:style>
+              <a:lnRef idx="2">
+                <a:schemeClr val="accent1">
+                  <a:shade val="50000"/>
+                </a:schemeClr>
+              </a:lnRef>
+              <a:fillRef idx="1">
+                <a:schemeClr val="accent1"/>
+              </a:fillRef>
+              <a:effectRef idx="0">
+                <a:schemeClr val="accent1"/>
+              </a:effectRef>
+              <a:fontRef idx="minor">
+                <a:schemeClr val="lt1"/>
+              </a:fontRef>
+            </p:style>
+            <p:txBody>
+              <a:bodyPr rtlCol="0" anchor="ctr"/>
+              <a:lstStyle/>
+              <a:p>
+                <a:pPr algn="ctr"/>
+                <a:r>
+                  <a:rPr lang="en-US" altLang="ja-JP" sz="2400" dirty="0" smtClean="0"/>
+                  <a:t>d7</a:t>
+                </a:r>
+                <a:endParaRPr kumimoji="1" lang="ja-JP" altLang="en-US" sz="2400" dirty="0"/>
+              </a:p>
+            </p:txBody>
+          </p:sp>
+          <p:sp>
+            <p:nvSpPr>
+              <p:cNvPr id="35" name="角丸四角形 34"/>
+              <p:cNvSpPr/>
+              <p:nvPr/>
+            </p:nvSpPr>
+            <p:spPr>
+              <a:xfrm>
+                <a:off x="1704439" y="3583705"/>
+                <a:ext cx="459641" cy="299447"/>
+              </a:xfrm>
+              <a:prstGeom prst="roundRect">
+                <a:avLst/>
+              </a:prstGeom>
+              <a:solidFill>
+                <a:srgbClr val="002060"/>
+              </a:solidFill>
+              <a:ln>
+                <a:noFill/>
+              </a:ln>
+            </p:spPr>
+            <p:style>
+              <a:lnRef idx="2">
+                <a:schemeClr val="accent1">
+                  <a:shade val="50000"/>
+                </a:schemeClr>
+              </a:lnRef>
+              <a:fillRef idx="1">
+                <a:schemeClr val="accent1"/>
+              </a:fillRef>
+              <a:effectRef idx="0">
+                <a:schemeClr val="accent1"/>
+              </a:effectRef>
+              <a:fontRef idx="minor">
+                <a:schemeClr val="lt1"/>
+              </a:fontRef>
+            </p:style>
+            <p:txBody>
+              <a:bodyPr rtlCol="0" anchor="ctr"/>
+              <a:lstStyle/>
+              <a:p>
+                <a:pPr algn="ctr"/>
+                <a:r>
+                  <a:rPr lang="en-US" altLang="ja-JP" dirty="0" smtClean="0"/>
+                  <a:t>d8</a:t>
+                </a:r>
+                <a:endParaRPr kumimoji="1" lang="ja-JP" altLang="en-US" dirty="0"/>
+              </a:p>
+            </p:txBody>
+          </p:sp>
+          <p:sp>
+            <p:nvSpPr>
+              <p:cNvPr id="36" name="角丸四角形 35"/>
+              <p:cNvSpPr/>
+              <p:nvPr/>
+            </p:nvSpPr>
+            <p:spPr>
+              <a:xfrm>
+                <a:off x="3118711" y="3583705"/>
+                <a:ext cx="459641" cy="299447"/>
+              </a:xfrm>
+              <a:prstGeom prst="roundRect">
+                <a:avLst/>
+              </a:prstGeom>
+              <a:solidFill>
+                <a:srgbClr val="002060"/>
+              </a:solidFill>
+              <a:ln>
+                <a:noFill/>
+              </a:ln>
+            </p:spPr>
+            <p:style>
+              <a:lnRef idx="2">
+                <a:schemeClr val="accent1">
+                  <a:shade val="50000"/>
+                </a:schemeClr>
+              </a:lnRef>
+              <a:fillRef idx="1">
+                <a:schemeClr val="accent1"/>
+              </a:fillRef>
+              <a:effectRef idx="0">
+                <a:schemeClr val="accent1"/>
+              </a:effectRef>
+              <a:fontRef idx="minor">
+                <a:schemeClr val="lt1"/>
+              </a:fontRef>
+            </p:style>
+            <p:txBody>
+              <a:bodyPr rtlCol="0" anchor="ctr"/>
+              <a:lstStyle/>
+              <a:p>
+                <a:pPr algn="ctr"/>
+                <a:r>
+                  <a:rPr lang="en-US" altLang="ja-JP" dirty="0" smtClean="0"/>
+                  <a:t>d9</a:t>
+                </a:r>
+                <a:endParaRPr kumimoji="1" lang="ja-JP" altLang="en-US" dirty="0"/>
+              </a:p>
+            </p:txBody>
+          </p:sp>
+          <p:sp>
+            <p:nvSpPr>
+              <p:cNvPr id="37" name="角丸四角形 36"/>
+              <p:cNvSpPr/>
+              <p:nvPr/>
+            </p:nvSpPr>
+            <p:spPr>
+              <a:xfrm>
+                <a:off x="3672841" y="4552159"/>
+                <a:ext cx="569976" cy="299447"/>
+              </a:xfrm>
+              <a:prstGeom prst="roundRect">
+                <a:avLst/>
+              </a:prstGeom>
+              <a:solidFill>
+                <a:srgbClr val="002060"/>
+              </a:solidFill>
+              <a:ln>
+                <a:noFill/>
+              </a:ln>
+            </p:spPr>
+            <p:style>
+              <a:lnRef idx="2">
+                <a:schemeClr val="accent1">
+                  <a:shade val="50000"/>
+                </a:schemeClr>
+              </a:lnRef>
+              <a:fillRef idx="1">
+                <a:schemeClr val="accent1"/>
+              </a:fillRef>
+              <a:effectRef idx="0">
+                <a:schemeClr val="accent1"/>
+              </a:effectRef>
+              <a:fontRef idx="minor">
+                <a:schemeClr val="lt1"/>
+              </a:fontRef>
+            </p:style>
+            <p:txBody>
+              <a:bodyPr rtlCol="0" anchor="ctr"/>
+              <a:lstStyle/>
+              <a:p>
+                <a:pPr algn="ctr"/>
+                <a:r>
+                  <a:rPr lang="en-US" altLang="ja-JP" dirty="0" smtClean="0"/>
+                  <a:t>d10</a:t>
+                </a:r>
+                <a:endParaRPr kumimoji="1" lang="ja-JP" altLang="en-US" dirty="0"/>
+              </a:p>
+            </p:txBody>
+          </p:sp>
+          <p:sp>
+            <p:nvSpPr>
+              <p:cNvPr id="38" name="角丸四角形 37"/>
+              <p:cNvSpPr/>
+              <p:nvPr/>
+            </p:nvSpPr>
+            <p:spPr>
+              <a:xfrm>
+                <a:off x="3672841" y="5408748"/>
+                <a:ext cx="569976" cy="299447"/>
+              </a:xfrm>
+              <a:prstGeom prst="roundRect">
+                <a:avLst/>
+              </a:prstGeom>
+              <a:solidFill>
+                <a:srgbClr val="002060"/>
+              </a:solidFill>
+              <a:ln>
+                <a:noFill/>
+              </a:ln>
+            </p:spPr>
+            <p:style>
+              <a:lnRef idx="2">
+                <a:schemeClr val="accent1">
+                  <a:shade val="50000"/>
+                </a:schemeClr>
+              </a:lnRef>
+              <a:fillRef idx="1">
+                <a:schemeClr val="accent1"/>
+              </a:fillRef>
+              <a:effectRef idx="0">
+                <a:schemeClr val="accent1"/>
+              </a:effectRef>
+              <a:fontRef idx="minor">
+                <a:schemeClr val="lt1"/>
+              </a:fontRef>
+            </p:style>
+            <p:txBody>
+              <a:bodyPr rtlCol="0" anchor="ctr"/>
+              <a:lstStyle/>
+              <a:p>
+                <a:pPr algn="ctr"/>
+                <a:r>
+                  <a:rPr lang="en-US" altLang="ja-JP" dirty="0" smtClean="0"/>
+                  <a:t>d11</a:t>
+                </a:r>
+                <a:endParaRPr kumimoji="1" lang="ja-JP" altLang="en-US" dirty="0"/>
+              </a:p>
+            </p:txBody>
+          </p:sp>
+        </p:grpSp>
+      </p:grpSp>
+    </p:spTree>
+    <p:extLst>
+      <p:ext uri="{BB962C8B-B14F-4D97-AF65-F5344CB8AC3E}">
+        <p14:creationId xmlns:p14="http://schemas.microsoft.com/office/powerpoint/2010/main" val="198068159"/>
+      </p:ext>
+    </p:extLst>
+  </p:cSld>
+  <p:clrMapOvr>
+    <a:masterClrMapping/>
+  </p:clrMapOvr>
+</p:sld>
+</file>
+
+<file path=ppt/slides/slide6.xml><?xml version="1.0" encoding="utf-8"?>
+<p:sld xmlns:a="http://schemas.openxmlformats.org/drawingml/2006/main" xmlns:r="http://schemas.openxmlformats.org/officeDocument/2006/relationships" xmlns:p="http://schemas.openxmlformats.org/presentationml/2006/main">
+  <p:cSld>
+    <p:spTree>
+      <p:nvGrpSpPr>
+        <p:cNvPr id="1" name=""/>
+        <p:cNvGrpSpPr/>
+        <p:nvPr/>
+      </p:nvGrpSpPr>
+      <p:grpSpPr>
+        <a:xfrm>
+          <a:off x="0" y="0"/>
+          <a:ext cx="0" cy="0"/>
+          <a:chOff x="0" y="0"/>
+          <a:chExt cx="0" cy="0"/>
+        </a:xfrm>
+      </p:grpSpPr>
+      <p:pic>
+        <p:nvPicPr>
+          <p:cNvPr id="4" name="図 3"/>
+          <p:cNvPicPr>
+            <a:picLocks noChangeAspect="1"/>
+          </p:cNvPicPr>
+          <p:nvPr/>
+        </p:nvPicPr>
+        <p:blipFill>
+          <a:blip r:embed="rId2"/>
+          <a:stretch>
+            <a:fillRect/>
+          </a:stretch>
+        </p:blipFill>
+        <p:spPr>
+          <a:xfrm>
+            <a:off x="4619625" y="2181225"/>
+            <a:ext cx="2952750" cy="2495550"/>
+          </a:xfrm>
+          <a:prstGeom prst="rect">
+            <a:avLst/>
+          </a:prstGeom>
+        </p:spPr>
+      </p:pic>
+    </p:spTree>
+    <p:extLst>
+      <p:ext uri="{BB962C8B-B14F-4D97-AF65-F5344CB8AC3E}">
+        <p14:creationId xmlns:p14="http://schemas.microsoft.com/office/powerpoint/2010/main" val="392730544"/>
+      </p:ext>
+    </p:extLst>
+  </p:cSld>
+  <p:clrMapOvr>
+    <a:masterClrMapping/>
+  </p:clrMapOvr>
+</p:sld>
+</file>
+
+<file path=ppt/slides/slide7.xml><?xml version="1.0" encoding="utf-8"?>
+<p:sld xmlns:a="http://schemas.openxmlformats.org/drawingml/2006/main" xmlns:r="http://schemas.openxmlformats.org/officeDocument/2006/relationships" xmlns:p="http://schemas.openxmlformats.org/presentationml/2006/main">
+  <p:cSld>
+    <p:spTree>
+      <p:nvGrpSpPr>
+        <p:cNvPr id="1" name=""/>
+        <p:cNvGrpSpPr/>
+        <p:nvPr/>
+      </p:nvGrpSpPr>
+      <p:grpSpPr>
+        <a:xfrm>
+          <a:off x="0" y="0"/>
+          <a:ext cx="0" cy="0"/>
+          <a:chOff x="0" y="0"/>
+          <a:chExt cx="0" cy="0"/>
+        </a:xfrm>
+      </p:grpSpPr>
+      <p:pic>
+        <p:nvPicPr>
+          <p:cNvPr id="4" name="図 3"/>
+          <p:cNvPicPr>
+            <a:picLocks noChangeAspect="1"/>
+          </p:cNvPicPr>
+          <p:nvPr/>
+        </p:nvPicPr>
+        <p:blipFill rotWithShape="1">
+          <a:blip r:embed="rId2"/>
+          <a:srcRect l="19833" r="14501" b="1852"/>
+          <a:stretch/>
+        </p:blipFill>
+        <p:spPr>
+          <a:xfrm>
+            <a:off x="2164080" y="617220"/>
+            <a:ext cx="6446520" cy="5419822"/>
+          </a:xfrm>
+          <a:prstGeom prst="rect">
+            <a:avLst/>
+          </a:prstGeom>
+        </p:spPr>
+      </p:pic>
+    </p:spTree>
+    <p:extLst>
+      <p:ext uri="{BB962C8B-B14F-4D97-AF65-F5344CB8AC3E}">
+        <p14:creationId xmlns:p14="http://schemas.microsoft.com/office/powerpoint/2010/main" val="4164872170"/>
+      </p:ext>
+    </p:extLst>
+  </p:cSld>
+  <p:clrMapOvr>
+    <a:masterClrMapping/>
+  </p:clrMapOvr>
+</p:sld>
+</file>
+
+<file path=ppt/slides/slide8.xml><?xml version="1.0" encoding="utf-8"?>
+<p:sld xmlns:a="http://schemas.openxmlformats.org/drawingml/2006/main" xmlns:r="http://schemas.openxmlformats.org/officeDocument/2006/relationships" xmlns:p="http://schemas.openxmlformats.org/presentationml/2006/main">
+  <p:cSld>
+    <p:spTree>
+      <p:nvGrpSpPr>
+        <p:cNvPr id="1" name=""/>
+        <p:cNvGrpSpPr/>
+        <p:nvPr/>
+      </p:nvGrpSpPr>
+      <p:grpSpPr>
+        <a:xfrm>
+          <a:off x="0" y="0"/>
+          <a:ext cx="0" cy="0"/>
+          <a:chOff x="0" y="0"/>
+          <a:chExt cx="0" cy="0"/>
+        </a:xfrm>
+      </p:grpSpPr>
+      <p:grpSp>
+        <p:nvGrpSpPr>
+          <p:cNvPr id="35" name="グループ化 34"/>
+          <p:cNvGrpSpPr/>
+          <p:nvPr/>
+        </p:nvGrpSpPr>
+        <p:grpSpPr>
+          <a:xfrm>
+            <a:off x="1283017" y="810728"/>
+            <a:ext cx="4028122" cy="5335754"/>
+            <a:chOff x="1283017" y="810728"/>
+            <a:chExt cx="4028122" cy="5335754"/>
+          </a:xfrm>
+        </p:grpSpPr>
+        <p:pic>
+          <p:nvPicPr>
+            <p:cNvPr id="4" name="図 3"/>
+            <p:cNvPicPr>
+              <a:picLocks noChangeAspect="1"/>
+            </p:cNvPicPr>
+            <p:nvPr/>
+          </p:nvPicPr>
+          <p:blipFill>
+            <a:blip r:embed="rId2"/>
+            <a:stretch>
+              <a:fillRect/>
+            </a:stretch>
+          </p:blipFill>
+          <p:spPr>
+            <a:xfrm>
+              <a:off x="1283017" y="955357"/>
+              <a:ext cx="3590925" cy="5191125"/>
+            </a:xfrm>
+            <a:prstGeom prst="rect">
+              <a:avLst/>
+            </a:prstGeom>
+          </p:spPr>
+        </p:pic>
+        <p:cxnSp>
+          <p:nvCxnSpPr>
+            <p:cNvPr id="5" name="直線矢印コネクタ 4"/>
+            <p:cNvCxnSpPr>
+              <a:stCxn id="6" idx="1"/>
+            </p:cNvCxnSpPr>
+            <p:nvPr/>
+          </p:nvCxnSpPr>
+          <p:spPr>
+            <a:xfrm flipH="1">
+              <a:off x="3180277" y="1150786"/>
+              <a:ext cx="438164" cy="601814"/>
+            </a:xfrm>
+            <a:prstGeom prst="straightConnector1">
+              <a:avLst/>
+            </a:prstGeom>
+            <a:ln w="28575">
+              <a:solidFill>
+                <a:srgbClr val="002060"/>
+              </a:solidFill>
+              <a:tailEnd type="stealth" w="lg" len="lg"/>
+            </a:ln>
+          </p:spPr>
+          <p:style>
+            <a:lnRef idx="1">
+              <a:schemeClr val="accent1"/>
+            </a:lnRef>
+            <a:fillRef idx="0">
+              <a:schemeClr val="accent1"/>
+            </a:fillRef>
+            <a:effectRef idx="0">
+              <a:schemeClr val="accent1"/>
+            </a:effectRef>
+            <a:fontRef idx="minor">
+              <a:schemeClr val="tx1"/>
+            </a:fontRef>
+          </p:style>
+        </p:cxnSp>
+        <p:sp>
+          <p:nvSpPr>
+            <p:cNvPr id="6" name="角丸四角形 5"/>
+            <p:cNvSpPr/>
+            <p:nvPr/>
+          </p:nvSpPr>
+          <p:spPr>
+            <a:xfrm>
+              <a:off x="3618441" y="1006157"/>
+              <a:ext cx="593754" cy="289258"/>
+            </a:xfrm>
+            <a:prstGeom prst="roundRect">
+              <a:avLst/>
+            </a:prstGeom>
+            <a:solidFill>
+              <a:srgbClr val="002060"/>
+            </a:solidFill>
+            <a:ln>
+              <a:noFill/>
+            </a:ln>
+          </p:spPr>
+          <p:style>
+            <a:lnRef idx="2">
+              <a:schemeClr val="accent1">
+                <a:shade val="50000"/>
+              </a:schemeClr>
+            </a:lnRef>
+            <a:fillRef idx="1">
+              <a:schemeClr val="accent1"/>
+            </a:fillRef>
+            <a:effectRef idx="0">
+              <a:schemeClr val="accent1"/>
+            </a:effectRef>
+            <a:fontRef idx="minor">
+              <a:schemeClr val="lt1"/>
+            </a:fontRef>
+          </p:style>
+          <p:txBody>
+            <a:bodyPr rtlCol="0" anchor="ctr"/>
+            <a:lstStyle/>
+            <a:p>
+              <a:pPr algn="ctr"/>
+              <a:r>
+                <a:rPr lang="en-US" altLang="ja-JP" sz="2400" dirty="0" smtClean="0"/>
+                <a:t>d2</a:t>
+              </a:r>
+              <a:endParaRPr kumimoji="1" lang="ja-JP" altLang="en-US" sz="2400" dirty="0"/>
+            </a:p>
+          </p:txBody>
+        </p:sp>
+        <p:cxnSp>
+          <p:nvCxnSpPr>
+            <p:cNvPr id="8" name="直線矢印コネクタ 7"/>
+            <p:cNvCxnSpPr>
+              <a:stCxn id="9" idx="1"/>
+            </p:cNvCxnSpPr>
+            <p:nvPr/>
+          </p:nvCxnSpPr>
+          <p:spPr>
+            <a:xfrm flipH="1">
+              <a:off x="4282441" y="1150786"/>
+              <a:ext cx="367918" cy="505333"/>
+            </a:xfrm>
+            <a:prstGeom prst="straightConnector1">
+              <a:avLst/>
+            </a:prstGeom>
+            <a:ln w="28575">
+              <a:solidFill>
+                <a:srgbClr val="002060"/>
+              </a:solidFill>
+              <a:tailEnd type="stealth" w="lg" len="lg"/>
+            </a:ln>
+          </p:spPr>
+          <p:style>
+            <a:lnRef idx="1">
+              <a:schemeClr val="accent1"/>
+            </a:lnRef>
+            <a:fillRef idx="0">
+              <a:schemeClr val="accent1"/>
+            </a:fillRef>
+            <a:effectRef idx="0">
+              <a:schemeClr val="accent1"/>
+            </a:effectRef>
+            <a:fontRef idx="minor">
+              <a:schemeClr val="tx1"/>
+            </a:fontRef>
+          </p:style>
+        </p:cxnSp>
+        <p:sp>
+          <p:nvSpPr>
+            <p:cNvPr id="9" name="角丸四角形 8"/>
+            <p:cNvSpPr/>
+            <p:nvPr/>
+          </p:nvSpPr>
+          <p:spPr>
+            <a:xfrm>
+              <a:off x="4650359" y="1006157"/>
+              <a:ext cx="593754" cy="289258"/>
+            </a:xfrm>
+            <a:prstGeom prst="roundRect">
+              <a:avLst/>
+            </a:prstGeom>
+            <a:solidFill>
+              <a:srgbClr val="002060"/>
+            </a:solidFill>
+            <a:ln>
+              <a:noFill/>
+            </a:ln>
+          </p:spPr>
+          <p:style>
+            <a:lnRef idx="2">
+              <a:schemeClr val="accent1">
+                <a:shade val="50000"/>
+              </a:schemeClr>
+            </a:lnRef>
+            <a:fillRef idx="1">
+              <a:schemeClr val="accent1"/>
+            </a:fillRef>
+            <a:effectRef idx="0">
+              <a:schemeClr val="accent1"/>
+            </a:effectRef>
+            <a:fontRef idx="minor">
+              <a:schemeClr val="lt1"/>
+            </a:fontRef>
+          </p:style>
+          <p:txBody>
+            <a:bodyPr rtlCol="0" anchor="ctr"/>
+            <a:lstStyle/>
+            <a:p>
+              <a:pPr algn="ctr"/>
+              <a:r>
+                <a:rPr lang="en-US" altLang="ja-JP" sz="2400" dirty="0" smtClean="0"/>
+                <a:t>d3</a:t>
+              </a:r>
+              <a:endParaRPr kumimoji="1" lang="ja-JP" altLang="en-US" sz="2400" dirty="0"/>
+            </a:p>
+          </p:txBody>
+        </p:sp>
+        <p:cxnSp>
+          <p:nvCxnSpPr>
+            <p:cNvPr id="11" name="直線矢印コネクタ 10"/>
+            <p:cNvCxnSpPr>
+              <a:stCxn id="12" idx="1"/>
+            </p:cNvCxnSpPr>
+            <p:nvPr/>
+          </p:nvCxnSpPr>
+          <p:spPr>
+            <a:xfrm flipH="1">
+              <a:off x="4234737" y="2105826"/>
+              <a:ext cx="415622" cy="216075"/>
+            </a:xfrm>
+            <a:prstGeom prst="straightConnector1">
+              <a:avLst/>
+            </a:prstGeom>
+            <a:ln w="28575">
+              <a:solidFill>
+                <a:srgbClr val="002060"/>
+              </a:solidFill>
+              <a:tailEnd type="stealth" w="lg" len="lg"/>
+            </a:ln>
+          </p:spPr>
+          <p:style>
+            <a:lnRef idx="1">
+              <a:schemeClr val="accent1"/>
+            </a:lnRef>
+            <a:fillRef idx="0">
+              <a:schemeClr val="accent1"/>
+            </a:fillRef>
+            <a:effectRef idx="0">
+              <a:schemeClr val="accent1"/>
+            </a:effectRef>
+            <a:fontRef idx="minor">
+              <a:schemeClr val="tx1"/>
+            </a:fontRef>
+          </p:style>
+        </p:cxnSp>
+        <p:sp>
+          <p:nvSpPr>
+            <p:cNvPr id="12" name="角丸四角形 11"/>
+            <p:cNvSpPr/>
+            <p:nvPr/>
+          </p:nvSpPr>
+          <p:spPr>
+            <a:xfrm>
+              <a:off x="4650359" y="1961197"/>
+              <a:ext cx="593754" cy="289258"/>
+            </a:xfrm>
+            <a:prstGeom prst="roundRect">
+              <a:avLst/>
+            </a:prstGeom>
+            <a:solidFill>
+              <a:srgbClr val="002060"/>
+            </a:solidFill>
+            <a:ln>
+              <a:noFill/>
+            </a:ln>
+          </p:spPr>
+          <p:style>
+            <a:lnRef idx="2">
+              <a:schemeClr val="accent1">
+                <a:shade val="50000"/>
+              </a:schemeClr>
+            </a:lnRef>
+            <a:fillRef idx="1">
+              <a:schemeClr val="accent1"/>
+            </a:fillRef>
+            <a:effectRef idx="0">
+              <a:schemeClr val="accent1"/>
+            </a:effectRef>
+            <a:fontRef idx="minor">
+              <a:schemeClr val="lt1"/>
+            </a:fontRef>
+          </p:style>
+          <p:txBody>
+            <a:bodyPr rtlCol="0" anchor="ctr"/>
+            <a:lstStyle/>
+            <a:p>
+              <a:pPr algn="ctr"/>
+              <a:r>
+                <a:rPr lang="en-US" altLang="ja-JP" sz="2400" dirty="0" smtClean="0"/>
+                <a:t>d4</a:t>
+              </a:r>
+              <a:endParaRPr kumimoji="1" lang="ja-JP" altLang="en-US" sz="2400" dirty="0"/>
+            </a:p>
+          </p:txBody>
+        </p:sp>
+        <p:cxnSp>
+          <p:nvCxnSpPr>
+            <p:cNvPr id="14" name="直線矢印コネクタ 13"/>
+            <p:cNvCxnSpPr>
+              <a:stCxn id="15" idx="1"/>
+            </p:cNvCxnSpPr>
+            <p:nvPr/>
+          </p:nvCxnSpPr>
+          <p:spPr>
+            <a:xfrm flipH="1">
+              <a:off x="4373880" y="2555533"/>
+              <a:ext cx="276479" cy="144629"/>
+            </a:xfrm>
+            <a:prstGeom prst="straightConnector1">
+              <a:avLst/>
+            </a:prstGeom>
+            <a:ln w="28575">
+              <a:solidFill>
+                <a:srgbClr val="002060"/>
+              </a:solidFill>
+              <a:tailEnd type="stealth" w="lg" len="lg"/>
+            </a:ln>
+          </p:spPr>
+          <p:style>
+            <a:lnRef idx="1">
+              <a:schemeClr val="accent1"/>
+            </a:lnRef>
+            <a:fillRef idx="0">
+              <a:schemeClr val="accent1"/>
+            </a:fillRef>
+            <a:effectRef idx="0">
+              <a:schemeClr val="accent1"/>
+            </a:effectRef>
+            <a:fontRef idx="minor">
+              <a:schemeClr val="tx1"/>
+            </a:fontRef>
+          </p:style>
+        </p:cxnSp>
+        <p:sp>
+          <p:nvSpPr>
+            <p:cNvPr id="15" name="角丸四角形 14"/>
+            <p:cNvSpPr/>
+            <p:nvPr/>
+          </p:nvSpPr>
+          <p:spPr>
+            <a:xfrm>
+              <a:off x="4650359" y="2410904"/>
+              <a:ext cx="593754" cy="289258"/>
+            </a:xfrm>
+            <a:prstGeom prst="roundRect">
+              <a:avLst/>
+            </a:prstGeom>
+            <a:solidFill>
+              <a:srgbClr val="002060"/>
+            </a:solidFill>
+            <a:ln>
+              <a:noFill/>
+            </a:ln>
+          </p:spPr>
+          <p:style>
+            <a:lnRef idx="2">
+              <a:schemeClr val="accent1">
+                <a:shade val="50000"/>
+              </a:schemeClr>
+            </a:lnRef>
+            <a:fillRef idx="1">
+              <a:schemeClr val="accent1"/>
+            </a:fillRef>
+            <a:effectRef idx="0">
+              <a:schemeClr val="accent1"/>
+            </a:effectRef>
+            <a:fontRef idx="minor">
+              <a:schemeClr val="lt1"/>
+            </a:fontRef>
+          </p:style>
+          <p:txBody>
+            <a:bodyPr rtlCol="0" anchor="ctr"/>
+            <a:lstStyle/>
+            <a:p>
+              <a:pPr algn="ctr"/>
+              <a:r>
+                <a:rPr lang="en-US" altLang="ja-JP" sz="2400" dirty="0" smtClean="0"/>
+                <a:t>d5</a:t>
+              </a:r>
+              <a:endParaRPr kumimoji="1" lang="ja-JP" altLang="en-US" sz="2400" dirty="0"/>
+            </a:p>
+          </p:txBody>
+        </p:sp>
+        <p:cxnSp>
+          <p:nvCxnSpPr>
+            <p:cNvPr id="17" name="直線矢印コネクタ 16"/>
+            <p:cNvCxnSpPr>
+              <a:stCxn id="18" idx="1"/>
+            </p:cNvCxnSpPr>
+            <p:nvPr/>
+          </p:nvCxnSpPr>
+          <p:spPr>
+            <a:xfrm flipH="1">
+              <a:off x="4373880" y="2873946"/>
+              <a:ext cx="276479" cy="144629"/>
+            </a:xfrm>
+            <a:prstGeom prst="straightConnector1">
+              <a:avLst/>
+            </a:prstGeom>
+            <a:ln w="28575">
+              <a:solidFill>
+                <a:srgbClr val="002060"/>
+              </a:solidFill>
+              <a:tailEnd type="stealth" w="lg" len="lg"/>
+            </a:ln>
+          </p:spPr>
+          <p:style>
+            <a:lnRef idx="1">
+              <a:schemeClr val="accent1"/>
+            </a:lnRef>
+            <a:fillRef idx="0">
+              <a:schemeClr val="accent1"/>
+            </a:fillRef>
+            <a:effectRef idx="0">
+              <a:schemeClr val="accent1"/>
+            </a:effectRef>
+            <a:fontRef idx="minor">
+              <a:schemeClr val="tx1"/>
+            </a:fontRef>
+          </p:style>
+        </p:cxnSp>
+        <p:sp>
+          <p:nvSpPr>
+            <p:cNvPr id="18" name="角丸四角形 17"/>
+            <p:cNvSpPr/>
+            <p:nvPr/>
+          </p:nvSpPr>
+          <p:spPr>
+            <a:xfrm>
+              <a:off x="4650359" y="2729317"/>
+              <a:ext cx="593754" cy="289258"/>
+            </a:xfrm>
+            <a:prstGeom prst="roundRect">
+              <a:avLst/>
+            </a:prstGeom>
+            <a:solidFill>
+              <a:srgbClr val="002060"/>
+            </a:solidFill>
+            <a:ln>
+              <a:noFill/>
+            </a:ln>
+          </p:spPr>
+          <p:style>
+            <a:lnRef idx="2">
+              <a:schemeClr val="accent1">
+                <a:shade val="50000"/>
+              </a:schemeClr>
+            </a:lnRef>
+            <a:fillRef idx="1">
+              <a:schemeClr val="accent1"/>
+            </a:fillRef>
+            <a:effectRef idx="0">
+              <a:schemeClr val="accent1"/>
+            </a:effectRef>
+            <a:fontRef idx="minor">
+              <a:schemeClr val="lt1"/>
+            </a:fontRef>
+          </p:style>
+          <p:txBody>
+            <a:bodyPr rtlCol="0" anchor="ctr"/>
+            <a:lstStyle/>
+            <a:p>
+              <a:pPr algn="ctr"/>
+              <a:r>
+                <a:rPr lang="en-US" altLang="ja-JP" sz="2400" dirty="0" smtClean="0"/>
+                <a:t>d6</a:t>
+              </a:r>
+              <a:endParaRPr kumimoji="1" lang="ja-JP" altLang="en-US" sz="2400" dirty="0"/>
+            </a:p>
+          </p:txBody>
+        </p:sp>
+        <p:cxnSp>
+          <p:nvCxnSpPr>
+            <p:cNvPr id="19" name="直線矢印コネクタ 18"/>
+            <p:cNvCxnSpPr>
+              <a:stCxn id="20" idx="1"/>
+            </p:cNvCxnSpPr>
+            <p:nvPr/>
+          </p:nvCxnSpPr>
+          <p:spPr>
+            <a:xfrm flipH="1">
+              <a:off x="4373880" y="3193520"/>
+              <a:ext cx="276479" cy="144629"/>
+            </a:xfrm>
+            <a:prstGeom prst="straightConnector1">
+              <a:avLst/>
+            </a:prstGeom>
+            <a:ln w="28575">
+              <a:solidFill>
+                <a:srgbClr val="002060"/>
+              </a:solidFill>
+              <a:tailEnd type="stealth" w="lg" len="lg"/>
+            </a:ln>
+          </p:spPr>
+          <p:style>
+            <a:lnRef idx="1">
+              <a:schemeClr val="accent1"/>
+            </a:lnRef>
+            <a:fillRef idx="0">
+              <a:schemeClr val="accent1"/>
+            </a:fillRef>
+            <a:effectRef idx="0">
+              <a:schemeClr val="accent1"/>
+            </a:effectRef>
+            <a:fontRef idx="minor">
+              <a:schemeClr val="tx1"/>
+            </a:fontRef>
+          </p:style>
+        </p:cxnSp>
+        <p:sp>
+          <p:nvSpPr>
+            <p:cNvPr id="20" name="角丸四角形 19"/>
+            <p:cNvSpPr/>
+            <p:nvPr/>
+          </p:nvSpPr>
+          <p:spPr>
+            <a:xfrm>
+              <a:off x="4650359" y="3048891"/>
+              <a:ext cx="593754" cy="289258"/>
+            </a:xfrm>
+            <a:prstGeom prst="roundRect">
+              <a:avLst/>
+            </a:prstGeom>
+            <a:solidFill>
+              <a:srgbClr val="002060"/>
+            </a:solidFill>
+            <a:ln>
+              <a:noFill/>
+            </a:ln>
+          </p:spPr>
+          <p:style>
+            <a:lnRef idx="2">
+              <a:schemeClr val="accent1">
+                <a:shade val="50000"/>
+              </a:schemeClr>
+            </a:lnRef>
+            <a:fillRef idx="1">
+              <a:schemeClr val="accent1"/>
+            </a:fillRef>
+            <a:effectRef idx="0">
+              <a:schemeClr val="accent1"/>
+            </a:effectRef>
+            <a:fontRef idx="minor">
+              <a:schemeClr val="lt1"/>
+            </a:fontRef>
+          </p:style>
+          <p:txBody>
+            <a:bodyPr rtlCol="0" anchor="ctr"/>
+            <a:lstStyle/>
+            <a:p>
+              <a:pPr algn="ctr"/>
+              <a:r>
+                <a:rPr lang="en-US" altLang="ja-JP" sz="2400" dirty="0" smtClean="0"/>
+                <a:t>d7</a:t>
+              </a:r>
+              <a:endParaRPr kumimoji="1" lang="ja-JP" altLang="en-US" sz="2400" dirty="0"/>
+            </a:p>
+          </p:txBody>
+        </p:sp>
+        <p:cxnSp>
+          <p:nvCxnSpPr>
+            <p:cNvPr id="21" name="直線矢印コネクタ 20"/>
+            <p:cNvCxnSpPr>
+              <a:stCxn id="22" idx="1"/>
+            </p:cNvCxnSpPr>
+            <p:nvPr/>
+          </p:nvCxnSpPr>
+          <p:spPr>
+            <a:xfrm flipH="1">
+              <a:off x="4373880" y="3513094"/>
+              <a:ext cx="276479" cy="144629"/>
+            </a:xfrm>
+            <a:prstGeom prst="straightConnector1">
+              <a:avLst/>
+            </a:prstGeom>
+            <a:ln w="28575">
+              <a:solidFill>
+                <a:srgbClr val="002060"/>
+              </a:solidFill>
+              <a:tailEnd type="stealth" w="lg" len="lg"/>
+            </a:ln>
+          </p:spPr>
+          <p:style>
+            <a:lnRef idx="1">
+              <a:schemeClr val="accent1"/>
+            </a:lnRef>
+            <a:fillRef idx="0">
+              <a:schemeClr val="accent1"/>
+            </a:fillRef>
+            <a:effectRef idx="0">
+              <a:schemeClr val="accent1"/>
+            </a:effectRef>
+            <a:fontRef idx="minor">
+              <a:schemeClr val="tx1"/>
+            </a:fontRef>
+          </p:style>
+        </p:cxnSp>
+        <p:sp>
+          <p:nvSpPr>
+            <p:cNvPr id="22" name="角丸四角形 21"/>
+            <p:cNvSpPr/>
+            <p:nvPr/>
+          </p:nvSpPr>
+          <p:spPr>
+            <a:xfrm>
+              <a:off x="4650359" y="3368465"/>
+              <a:ext cx="593754" cy="289258"/>
+            </a:xfrm>
+            <a:prstGeom prst="roundRect">
+              <a:avLst/>
+            </a:prstGeom>
+            <a:solidFill>
+              <a:srgbClr val="002060"/>
+            </a:solidFill>
+            <a:ln>
+              <a:noFill/>
+            </a:ln>
+          </p:spPr>
+          <p:style>
+            <a:lnRef idx="2">
+              <a:schemeClr val="accent1">
+                <a:shade val="50000"/>
+              </a:schemeClr>
+            </a:lnRef>
+            <a:fillRef idx="1">
+              <a:schemeClr val="accent1"/>
+            </a:fillRef>
+            <a:effectRef idx="0">
+              <a:schemeClr val="accent1"/>
+            </a:effectRef>
+            <a:fontRef idx="minor">
+              <a:schemeClr val="lt1"/>
+            </a:fontRef>
+          </p:style>
+          <p:txBody>
+            <a:bodyPr rtlCol="0" anchor="ctr"/>
+            <a:lstStyle/>
+            <a:p>
+              <a:pPr algn="ctr"/>
+              <a:r>
+                <a:rPr lang="en-US" altLang="ja-JP" sz="2400" dirty="0" smtClean="0"/>
+                <a:t>d8</a:t>
+              </a:r>
+              <a:endParaRPr kumimoji="1" lang="ja-JP" altLang="en-US" sz="2400" dirty="0"/>
+            </a:p>
+          </p:txBody>
+        </p:sp>
+        <p:cxnSp>
+          <p:nvCxnSpPr>
+            <p:cNvPr id="23" name="直線矢印コネクタ 22"/>
+            <p:cNvCxnSpPr>
+              <a:stCxn id="24" idx="1"/>
+            </p:cNvCxnSpPr>
+            <p:nvPr/>
+          </p:nvCxnSpPr>
+          <p:spPr>
+            <a:xfrm flipH="1">
+              <a:off x="4373880" y="4162868"/>
+              <a:ext cx="276479" cy="144629"/>
+            </a:xfrm>
+            <a:prstGeom prst="straightConnector1">
+              <a:avLst/>
+            </a:prstGeom>
+            <a:ln w="28575">
+              <a:solidFill>
+                <a:srgbClr val="002060"/>
+              </a:solidFill>
+              <a:tailEnd type="stealth" w="lg" len="lg"/>
+            </a:ln>
+          </p:spPr>
+          <p:style>
+            <a:lnRef idx="1">
+              <a:schemeClr val="accent1"/>
+            </a:lnRef>
+            <a:fillRef idx="0">
+              <a:schemeClr val="accent1"/>
+            </a:fillRef>
+            <a:effectRef idx="0">
+              <a:schemeClr val="accent1"/>
+            </a:effectRef>
+            <a:fontRef idx="minor">
+              <a:schemeClr val="tx1"/>
+            </a:fontRef>
+          </p:style>
+        </p:cxnSp>
+        <p:sp>
+          <p:nvSpPr>
+            <p:cNvPr id="24" name="角丸四角形 23"/>
+            <p:cNvSpPr/>
+            <p:nvPr/>
+          </p:nvSpPr>
+          <p:spPr>
+            <a:xfrm>
+              <a:off x="4650359" y="4018239"/>
+              <a:ext cx="593754" cy="289258"/>
+            </a:xfrm>
+            <a:prstGeom prst="roundRect">
+              <a:avLst/>
+            </a:prstGeom>
+            <a:solidFill>
+              <a:srgbClr val="002060"/>
+            </a:solidFill>
+            <a:ln>
+              <a:noFill/>
+            </a:ln>
+          </p:spPr>
+          <p:style>
+            <a:lnRef idx="2">
+              <a:schemeClr val="accent1">
+                <a:shade val="50000"/>
+              </a:schemeClr>
+            </a:lnRef>
+            <a:fillRef idx="1">
+              <a:schemeClr val="accent1"/>
+            </a:fillRef>
+            <a:effectRef idx="0">
+              <a:schemeClr val="accent1"/>
+            </a:effectRef>
+            <a:fontRef idx="minor">
+              <a:schemeClr val="lt1"/>
+            </a:fontRef>
+          </p:style>
+          <p:txBody>
+            <a:bodyPr rtlCol="0" anchor="ctr"/>
+            <a:lstStyle/>
+            <a:p>
+              <a:pPr algn="ctr"/>
+              <a:r>
+                <a:rPr lang="en-US" altLang="ja-JP" sz="2400" dirty="0" smtClean="0"/>
+                <a:t>d9</a:t>
+              </a:r>
+              <a:endParaRPr kumimoji="1" lang="ja-JP" altLang="en-US" sz="2400" dirty="0"/>
+            </a:p>
+          </p:txBody>
+        </p:sp>
+        <p:cxnSp>
+          <p:nvCxnSpPr>
+            <p:cNvPr id="25" name="直線矢印コネクタ 24"/>
+            <p:cNvCxnSpPr>
+              <a:stCxn id="26" idx="1"/>
+            </p:cNvCxnSpPr>
+            <p:nvPr/>
+          </p:nvCxnSpPr>
+          <p:spPr>
+            <a:xfrm flipH="1">
+              <a:off x="4373882" y="4492561"/>
+              <a:ext cx="276476" cy="144629"/>
+            </a:xfrm>
+            <a:prstGeom prst="straightConnector1">
+              <a:avLst/>
+            </a:prstGeom>
+            <a:ln w="28575">
+              <a:solidFill>
+                <a:srgbClr val="002060"/>
+              </a:solidFill>
+              <a:tailEnd type="stealth" w="lg" len="lg"/>
+            </a:ln>
+          </p:spPr>
+          <p:style>
+            <a:lnRef idx="1">
+              <a:schemeClr val="accent1"/>
+            </a:lnRef>
+            <a:fillRef idx="0">
+              <a:schemeClr val="accent1"/>
+            </a:fillRef>
+            <a:effectRef idx="0">
+              <a:schemeClr val="accent1"/>
+            </a:effectRef>
+            <a:fontRef idx="minor">
+              <a:schemeClr val="tx1"/>
+            </a:fontRef>
+          </p:style>
+        </p:cxnSp>
+        <p:sp>
+          <p:nvSpPr>
+            <p:cNvPr id="26" name="角丸四角形 25"/>
+            <p:cNvSpPr/>
+            <p:nvPr/>
+          </p:nvSpPr>
+          <p:spPr>
+            <a:xfrm>
+              <a:off x="4650358" y="4347932"/>
+              <a:ext cx="660781" cy="289258"/>
+            </a:xfrm>
+            <a:prstGeom prst="roundRect">
+              <a:avLst/>
+            </a:prstGeom>
+            <a:solidFill>
+              <a:srgbClr val="002060"/>
+            </a:solidFill>
+            <a:ln>
+              <a:noFill/>
+            </a:ln>
+          </p:spPr>
+          <p:style>
+            <a:lnRef idx="2">
+              <a:schemeClr val="accent1">
+                <a:shade val="50000"/>
+              </a:schemeClr>
+            </a:lnRef>
+            <a:fillRef idx="1">
+              <a:schemeClr val="accent1"/>
+            </a:fillRef>
+            <a:effectRef idx="0">
+              <a:schemeClr val="accent1"/>
+            </a:effectRef>
+            <a:fontRef idx="minor">
+              <a:schemeClr val="lt1"/>
+            </a:fontRef>
+          </p:style>
+          <p:txBody>
+            <a:bodyPr rtlCol="0" anchor="ctr"/>
+            <a:lstStyle/>
+            <a:p>
+              <a:pPr algn="ctr"/>
+              <a:r>
+                <a:rPr lang="en-US" altLang="ja-JP" sz="2000" dirty="0" smtClean="0"/>
+                <a:t>d10</a:t>
+              </a:r>
+              <a:endParaRPr kumimoji="1" lang="ja-JP" altLang="en-US" sz="2000" dirty="0"/>
+            </a:p>
+          </p:txBody>
+        </p:sp>
+        <p:cxnSp>
+          <p:nvCxnSpPr>
+            <p:cNvPr id="27" name="直線矢印コネクタ 26"/>
+            <p:cNvCxnSpPr>
+              <a:stCxn id="28" idx="1"/>
+            </p:cNvCxnSpPr>
+            <p:nvPr/>
+          </p:nvCxnSpPr>
+          <p:spPr>
+            <a:xfrm flipH="1">
+              <a:off x="4373881" y="4826484"/>
+              <a:ext cx="276478" cy="144629"/>
+            </a:xfrm>
+            <a:prstGeom prst="straightConnector1">
+              <a:avLst/>
+            </a:prstGeom>
+            <a:ln w="28575">
+              <a:solidFill>
+                <a:srgbClr val="002060"/>
+              </a:solidFill>
+              <a:tailEnd type="stealth" w="lg" len="lg"/>
+            </a:ln>
+          </p:spPr>
+          <p:style>
+            <a:lnRef idx="1">
+              <a:schemeClr val="accent1"/>
+            </a:lnRef>
+            <a:fillRef idx="0">
+              <a:schemeClr val="accent1"/>
+            </a:fillRef>
+            <a:effectRef idx="0">
+              <a:schemeClr val="accent1"/>
+            </a:effectRef>
+            <a:fontRef idx="minor">
+              <a:schemeClr val="tx1"/>
+            </a:fontRef>
+          </p:style>
+        </p:cxnSp>
+        <p:sp>
+          <p:nvSpPr>
+            <p:cNvPr id="28" name="角丸四角形 27"/>
+            <p:cNvSpPr/>
+            <p:nvPr/>
+          </p:nvSpPr>
+          <p:spPr>
+            <a:xfrm>
+              <a:off x="4650359" y="4681855"/>
+              <a:ext cx="660780" cy="289258"/>
+            </a:xfrm>
+            <a:prstGeom prst="roundRect">
+              <a:avLst/>
+            </a:prstGeom>
+            <a:solidFill>
+              <a:srgbClr val="002060"/>
+            </a:solidFill>
+            <a:ln>
+              <a:noFill/>
+            </a:ln>
+          </p:spPr>
+          <p:style>
+            <a:lnRef idx="2">
+              <a:schemeClr val="accent1">
+                <a:shade val="50000"/>
+              </a:schemeClr>
+            </a:lnRef>
+            <a:fillRef idx="1">
+              <a:schemeClr val="accent1"/>
+            </a:fillRef>
+            <a:effectRef idx="0">
+              <a:schemeClr val="accent1"/>
+            </a:effectRef>
+            <a:fontRef idx="minor">
+              <a:schemeClr val="lt1"/>
+            </a:fontRef>
+          </p:style>
+          <p:txBody>
+            <a:bodyPr rtlCol="0" anchor="ctr"/>
+            <a:lstStyle/>
+            <a:p>
+              <a:pPr algn="ctr"/>
+              <a:r>
+                <a:rPr lang="en-US" altLang="ja-JP" sz="2000" dirty="0" smtClean="0"/>
+                <a:t>d11</a:t>
+              </a:r>
+              <a:endParaRPr kumimoji="1" lang="ja-JP" altLang="en-US" sz="2000" dirty="0"/>
+            </a:p>
+          </p:txBody>
+        </p:sp>
+        <p:cxnSp>
+          <p:nvCxnSpPr>
+            <p:cNvPr id="29" name="直線矢印コネクタ 28"/>
+            <p:cNvCxnSpPr>
+              <a:stCxn id="30" idx="1"/>
+            </p:cNvCxnSpPr>
+            <p:nvPr/>
+          </p:nvCxnSpPr>
+          <p:spPr>
+            <a:xfrm flipH="1">
+              <a:off x="2008117" y="955357"/>
+              <a:ext cx="173362" cy="591352"/>
+            </a:xfrm>
+            <a:prstGeom prst="straightConnector1">
+              <a:avLst/>
+            </a:prstGeom>
+            <a:ln w="28575">
+              <a:solidFill>
+                <a:srgbClr val="002060"/>
+              </a:solidFill>
+              <a:tailEnd type="stealth" w="lg" len="lg"/>
+            </a:ln>
+          </p:spPr>
+          <p:style>
+            <a:lnRef idx="1">
+              <a:schemeClr val="accent1"/>
+            </a:lnRef>
+            <a:fillRef idx="0">
+              <a:schemeClr val="accent1"/>
+            </a:fillRef>
+            <a:effectRef idx="0">
+              <a:schemeClr val="accent1"/>
+            </a:effectRef>
+            <a:fontRef idx="minor">
+              <a:schemeClr val="tx1"/>
+            </a:fontRef>
+          </p:style>
+        </p:cxnSp>
+        <p:sp>
+          <p:nvSpPr>
+            <p:cNvPr id="30" name="角丸四角形 29"/>
+            <p:cNvSpPr/>
+            <p:nvPr/>
+          </p:nvSpPr>
+          <p:spPr>
+            <a:xfrm>
+              <a:off x="2181479" y="810728"/>
+              <a:ext cx="593754" cy="289258"/>
+            </a:xfrm>
+            <a:prstGeom prst="roundRect">
+              <a:avLst/>
+            </a:prstGeom>
+            <a:solidFill>
+              <a:srgbClr val="002060"/>
+            </a:solidFill>
+            <a:ln>
+              <a:noFill/>
+            </a:ln>
+          </p:spPr>
+          <p:style>
+            <a:lnRef idx="2">
+              <a:schemeClr val="accent1">
+                <a:shade val="50000"/>
+              </a:schemeClr>
+            </a:lnRef>
+            <a:fillRef idx="1">
+              <a:schemeClr val="accent1"/>
+            </a:fillRef>
+            <a:effectRef idx="0">
+              <a:schemeClr val="accent1"/>
+            </a:effectRef>
+            <a:fontRef idx="minor">
+              <a:schemeClr val="lt1"/>
+            </a:fontRef>
+          </p:style>
+          <p:txBody>
+            <a:bodyPr rtlCol="0" anchor="ctr"/>
+            <a:lstStyle/>
+            <a:p>
+              <a:pPr algn="ctr"/>
+              <a:r>
+                <a:rPr lang="en-US" altLang="ja-JP" sz="2400" dirty="0" smtClean="0"/>
+                <a:t>d1</a:t>
+              </a:r>
+              <a:endParaRPr kumimoji="1" lang="ja-JP" altLang="en-US" sz="2400" dirty="0"/>
+            </a:p>
+          </p:txBody>
+        </p:sp>
+      </p:grpSp>
+    </p:spTree>
+    <p:extLst>
+      <p:ext uri="{BB962C8B-B14F-4D97-AF65-F5344CB8AC3E}">
+        <p14:creationId xmlns:p14="http://schemas.microsoft.com/office/powerpoint/2010/main" val="474070919"/>
+      </p:ext>
+    </p:extLst>
+  </p:cSld>
+  <p:clrMapOvr>
+    <a:masterClrMapping/>
+  </p:clrMapOvr>
+</p:sld>
+</file>
+
 <file path=ppt/theme/theme1.xml><?xml version="1.0" encoding="utf-8"?>
 <a:theme xmlns:a="http://schemas.openxmlformats.org/drawingml/2006/main" name="Office テーマ">
   <a:themeElements>

</xml_diff>